<commit_message>
world of data slide
</commit_message>
<xml_diff>
--- a/WhatIsDataAnalysis.pptx
+++ b/WhatIsDataAnalysis.pptx
@@ -6,6 +6,7 @@
   </p:sldMasterIdLst>
   <p:sldIdLst>
     <p:sldId id="256" r:id="rId2"/>
+    <p:sldId id="257" r:id="rId3"/>
   </p:sldIdLst>
   <p:sldSz cx="12192000" cy="6858000"/>
   <p:notesSz cx="6858000" cy="9144000"/>
@@ -3416,6 +3417,99 @@
 </p:sld>
 </file>
 
+<file path=ppt/slides/slide2.xml><?xml version="1.0" encoding="utf-8"?>
+<p:sld xmlns:a="http://schemas.openxmlformats.org/drawingml/2006/main" xmlns:r="http://schemas.openxmlformats.org/officeDocument/2006/relationships" xmlns:p="http://schemas.openxmlformats.org/presentationml/2006/main">
+  <p:cSld>
+    <p:spTree>
+      <p:nvGrpSpPr>
+        <p:cNvPr id="1" name=""/>
+        <p:cNvGrpSpPr/>
+        <p:nvPr/>
+      </p:nvGrpSpPr>
+      <p:grpSpPr>
+        <a:xfrm>
+          <a:off x="0" y="0"/>
+          <a:ext cx="0" cy="0"/>
+          <a:chOff x="0" y="0"/>
+          <a:chExt cx="0" cy="0"/>
+        </a:xfrm>
+      </p:grpSpPr>
+      <p:sp>
+        <p:nvSpPr>
+          <p:cNvPr id="2" name="Title 1">
+            <a:extLst>
+              <a:ext uri="{FF2B5EF4-FFF2-40B4-BE49-F238E27FC236}">
+                <a16:creationId xmlns:a16="http://schemas.microsoft.com/office/drawing/2014/main" id="{126E8C34-9DFB-1128-42B7-690B0123C4EF}"/>
+              </a:ext>
+            </a:extLst>
+          </p:cNvPr>
+          <p:cNvSpPr>
+            <a:spLocks noGrp="1"/>
+          </p:cNvSpPr>
+          <p:nvPr>
+            <p:ph type="title"/>
+          </p:nvPr>
+        </p:nvSpPr>
+        <p:spPr/>
+        <p:txBody>
+          <a:bodyPr/>
+          <a:lstStyle/>
+          <a:p>
+            <a:r>
+              <a:rPr lang="en-US" dirty="0"/>
+              <a:t>A world of data</a:t>
+            </a:r>
+          </a:p>
+        </p:txBody>
+      </p:sp>
+      <p:pic>
+        <p:nvPicPr>
+          <p:cNvPr id="5" name="Content Placeholder 4" descr="A circular diagram of different types of data&#10;&#10;Description automatically generated">
+            <a:extLst>
+              <a:ext uri="{FF2B5EF4-FFF2-40B4-BE49-F238E27FC236}">
+                <a16:creationId xmlns:a16="http://schemas.microsoft.com/office/drawing/2014/main" id="{704E53A1-A410-D542-DC8B-B162F40E374D}"/>
+              </a:ext>
+            </a:extLst>
+          </p:cNvPr>
+          <p:cNvPicPr>
+            <a:picLocks noGrp="1" noChangeAspect="1"/>
+          </p:cNvPicPr>
+          <p:nvPr>
+            <p:ph idx="1"/>
+          </p:nvPr>
+        </p:nvPicPr>
+        <p:blipFill>
+          <a:blip r:embed="rId2">
+            <a:extLst>
+              <a:ext uri="{28A0092B-C50C-407E-A947-70E740481C1C}">
+                <a14:useLocalDpi xmlns:a14="http://schemas.microsoft.com/office/drawing/2010/main" val="0"/>
+              </a:ext>
+            </a:extLst>
+          </a:blip>
+          <a:stretch>
+            <a:fillRect/>
+          </a:stretch>
+        </p:blipFill>
+        <p:spPr>
+          <a:xfrm>
+            <a:off x="4006313" y="1825625"/>
+            <a:ext cx="4179374" cy="4351338"/>
+          </a:xfrm>
+        </p:spPr>
+      </p:pic>
+    </p:spTree>
+    <p:extLst>
+      <p:ext uri="{BB962C8B-B14F-4D97-AF65-F5344CB8AC3E}">
+        <p14:creationId xmlns:p14="http://schemas.microsoft.com/office/powerpoint/2010/main" val="867936628"/>
+      </p:ext>
+    </p:extLst>
+  </p:cSld>
+  <p:clrMapOvr>
+    <a:masterClrMapping/>
+  </p:clrMapOvr>
+</p:sld>
+</file>
+
 <file path=ppt/theme/theme1.xml><?xml version="1.0" encoding="utf-8"?>
 <a:theme xmlns:a="http://schemas.openxmlformats.org/drawingml/2006/main" name="Office Theme">
   <a:themeElements>

</xml_diff>

<commit_message>
added animation to massive data slide
</commit_message>
<xml_diff>
--- a/WhatIsDataAnalysis.pptx
+++ b/WhatIsDataAnalysis.pptx
@@ -4538,9 +4538,11 @@
           <a:p>
             <a:pPr algn="ctr"/>
             <a:r>
-              <a:rPr lang="en-US" sz="6600">
+              <a:rPr lang="en-US" sz="6600" dirty="0">
                 <a:solidFill>
-                  <a:schemeClr val="bg1"/>
+                  <a:schemeClr val="bg1">
+                    <a:lumMod val="50000"/>
+                  </a:schemeClr>
                 </a:solidFill>
               </a:rPr>
               <a:t>Massive data</a:t>
@@ -5492,6 +5494,72 @@
           </a:p>
         </p:txBody>
       </p:sp>
+      <p:sp>
+        <p:nvSpPr>
+          <p:cNvPr id="16" name="Title 1">
+            <a:extLst>
+              <a:ext uri="{FF2B5EF4-FFF2-40B4-BE49-F238E27FC236}">
+                <a16:creationId xmlns:a16="http://schemas.microsoft.com/office/drawing/2014/main" id="{C7212E58-49D1-F21A-8B59-E7FE823CCB06}"/>
+              </a:ext>
+            </a:extLst>
+          </p:cNvPr>
+          <p:cNvSpPr txBox="1">
+            <a:spLocks/>
+          </p:cNvSpPr>
+          <p:nvPr/>
+        </p:nvSpPr>
+        <p:spPr>
+          <a:xfrm rot="20571294">
+            <a:off x="2049726" y="2772082"/>
+            <a:ext cx="8377252" cy="1181903"/>
+          </a:xfrm>
+          <a:prstGeom prst="rect">
+            <a:avLst/>
+          </a:prstGeom>
+          <a:noFill/>
+        </p:spPr>
+        <p:txBody>
+          <a:bodyPr vert="horz" lIns="91440" tIns="45720" rIns="91440" bIns="45720" rtlCol="0" anchor="ctr">
+            <a:normAutofit/>
+          </a:bodyPr>
+          <a:lstStyle>
+            <a:lvl1pPr algn="l" defTabSz="914400" rtl="0" eaLnBrk="1" latinLnBrk="0" hangingPunct="1">
+              <a:lnSpc>
+                <a:spcPct val="90000"/>
+              </a:lnSpc>
+              <a:spcBef>
+                <a:spcPct val="0"/>
+              </a:spcBef>
+              <a:buNone/>
+              <a:defRPr sz="4400" kern="1200">
+                <a:solidFill>
+                  <a:schemeClr val="tx1"/>
+                </a:solidFill>
+                <a:latin typeface="+mj-lt"/>
+                <a:ea typeface="+mj-ea"/>
+                <a:cs typeface="+mj-cs"/>
+              </a:defRPr>
+            </a:lvl1pPr>
+          </a:lstStyle>
+          <a:p>
+            <a:r>
+              <a:rPr lang="en-US" dirty="0">
+                <a:solidFill>
+                  <a:schemeClr val="bg1"/>
+                </a:solidFill>
+                <a:effectLst>
+                  <a:glow rad="228600">
+                    <a:srgbClr val="C00000">
+                      <a:alpha val="40000"/>
+                    </a:srgbClr>
+                  </a:glow>
+                </a:effectLst>
+              </a:rPr>
+              <a:t>How to make some sense out of it?</a:t>
+            </a:r>
+          </a:p>
+        </p:txBody>
+      </p:sp>
     </p:spTree>
     <p:extLst>
       <p:ext uri="{BB962C8B-B14F-4D97-AF65-F5344CB8AC3E}">
@@ -5502,6 +5570,92 @@
   <p:clrMapOvr>
     <a:masterClrMapping/>
   </p:clrMapOvr>
+  <p:timing>
+    <p:tnLst>
+      <p:par>
+        <p:cTn id="1" dur="indefinite" restart="never" nodeType="tmRoot">
+          <p:childTnLst>
+            <p:seq concurrent="1" nextAc="seek">
+              <p:cTn id="2" dur="indefinite" nodeType="mainSeq">
+                <p:childTnLst>
+                  <p:par>
+                    <p:cTn id="3" fill="hold">
+                      <p:stCondLst>
+                        <p:cond delay="indefinite"/>
+                      </p:stCondLst>
+                      <p:childTnLst>
+                        <p:par>
+                          <p:cTn id="4" fill="hold">
+                            <p:stCondLst>
+                              <p:cond delay="0"/>
+                            </p:stCondLst>
+                            <p:childTnLst>
+                              <p:par>
+                                <p:cTn id="5" presetID="10" presetClass="entr" presetSubtype="0" fill="hold" grpId="0" nodeType="clickEffect">
+                                  <p:stCondLst>
+                                    <p:cond delay="0"/>
+                                  </p:stCondLst>
+                                  <p:childTnLst>
+                                    <p:set>
+                                      <p:cBhvr>
+                                        <p:cTn id="6" dur="1" fill="hold">
+                                          <p:stCondLst>
+                                            <p:cond delay="0"/>
+                                          </p:stCondLst>
+                                        </p:cTn>
+                                        <p:tgtEl>
+                                          <p:spTgt spid="16"/>
+                                        </p:tgtEl>
+                                        <p:attrNameLst>
+                                          <p:attrName>style.visibility</p:attrName>
+                                        </p:attrNameLst>
+                                      </p:cBhvr>
+                                      <p:to>
+                                        <p:strVal val="visible"/>
+                                      </p:to>
+                                    </p:set>
+                                    <p:animEffect transition="in" filter="fade">
+                                      <p:cBhvr>
+                                        <p:cTn id="7" dur="500"/>
+                                        <p:tgtEl>
+                                          <p:spTgt spid="16"/>
+                                        </p:tgtEl>
+                                      </p:cBhvr>
+                                    </p:animEffect>
+                                  </p:childTnLst>
+                                </p:cTn>
+                              </p:par>
+                            </p:childTnLst>
+                          </p:cTn>
+                        </p:par>
+                      </p:childTnLst>
+                    </p:cTn>
+                  </p:par>
+                </p:childTnLst>
+              </p:cTn>
+              <p:prevCondLst>
+                <p:cond evt="onPrev" delay="0">
+                  <p:tgtEl>
+                    <p:sldTgt/>
+                  </p:tgtEl>
+                </p:cond>
+              </p:prevCondLst>
+              <p:nextCondLst>
+                <p:cond evt="onNext" delay="0">
+                  <p:tgtEl>
+                    <p:sldTgt/>
+                  </p:tgtEl>
+                </p:cond>
+              </p:nextCondLst>
+            </p:seq>
+          </p:childTnLst>
+        </p:cTn>
+      </p:par>
+    </p:tnLst>
+    <p:bldLst>
+      <p:bldP spid="16" grpId="0"/>
+    </p:bldLst>
+  </p:timing>
 </p:sld>
 </file>
 

</xml_diff>

<commit_message>
better world of data (added links)
</commit_message>
<xml_diff>
--- a/WhatIsDataAnalysis.pptx
+++ b/WhatIsDataAnalysis.pptx
@@ -3498,446 +3498,1095 @@
           </a:xfrm>
         </p:spPr>
       </p:pic>
-      <p:sp>
-        <p:nvSpPr>
-          <p:cNvPr id="6" name="Oval 5">
-            <a:extLst>
-              <a:ext uri="{FF2B5EF4-FFF2-40B4-BE49-F238E27FC236}">
-                <a16:creationId xmlns:a16="http://schemas.microsoft.com/office/drawing/2014/main" id="{B591B657-BBE1-C50C-BEE9-AA349B9EEE42}"/>
-              </a:ext>
-            </a:extLst>
-          </p:cNvPr>
-          <p:cNvSpPr/>
+      <p:grpSp>
+        <p:nvGrpSpPr>
+          <p:cNvPr id="63" name="Group 62">
+            <a:extLst>
+              <a:ext uri="{FF2B5EF4-FFF2-40B4-BE49-F238E27FC236}">
+                <a16:creationId xmlns:a16="http://schemas.microsoft.com/office/drawing/2014/main" id="{A8155BB1-DA85-79FF-ED16-B900014BE82D}"/>
+              </a:ext>
+            </a:extLst>
+          </p:cNvPr>
+          <p:cNvGrpSpPr/>
           <p:nvPr/>
-        </p:nvSpPr>
-        <p:spPr>
+        </p:nvGrpSpPr>
+        <p:grpSpPr>
+          <a:xfrm>
+            <a:off x="6143223" y="470475"/>
+            <a:ext cx="2420570" cy="3096973"/>
+            <a:chOff x="6143223" y="470475"/>
+            <a:chExt cx="2420570" cy="3096973"/>
+          </a:xfrm>
+        </p:grpSpPr>
+        <p:sp>
+          <p:nvSpPr>
+            <p:cNvPr id="7" name="Oval 6">
+              <a:extLst>
+                <a:ext uri="{FF2B5EF4-FFF2-40B4-BE49-F238E27FC236}">
+                  <a16:creationId xmlns:a16="http://schemas.microsoft.com/office/drawing/2014/main" id="{8EB88608-8E9E-53AC-1B55-0E704B28C2F4}"/>
+                </a:ext>
+              </a:extLst>
+            </p:cNvPr>
+            <p:cNvSpPr/>
+            <p:nvPr/>
+          </p:nvSpPr>
+          <p:spPr>
+            <a:xfrm>
+              <a:off x="7276111" y="470475"/>
+              <a:ext cx="1287682" cy="1287682"/>
+            </a:xfrm>
+            <a:prstGeom prst="ellipse">
+              <a:avLst/>
+            </a:prstGeom>
+            <a:solidFill>
+              <a:srgbClr val="1D193D"/>
+            </a:solidFill>
+            <a:ln>
+              <a:noFill/>
+            </a:ln>
+          </p:spPr>
+          <p:style>
+            <a:lnRef idx="2">
+              <a:schemeClr val="accent1">
+                <a:shade val="15000"/>
+              </a:schemeClr>
+            </a:lnRef>
+            <a:fillRef idx="1">
+              <a:schemeClr val="accent1"/>
+            </a:fillRef>
+            <a:effectRef idx="0">
+              <a:schemeClr val="accent1"/>
+            </a:effectRef>
+            <a:fontRef idx="minor">
+              <a:schemeClr val="lt1"/>
+            </a:fontRef>
+          </p:style>
+          <p:txBody>
+            <a:bodyPr rtlCol="0" anchor="ctr"/>
+            <a:lstStyle/>
+            <a:p>
+              <a:pPr algn="ctr"/>
+              <a:r>
+                <a:rPr lang="en-US" dirty="0"/>
+                <a:t>Sensors</a:t>
+              </a:r>
+            </a:p>
+          </p:txBody>
+        </p:sp>
+        <p:cxnSp>
+          <p:nvCxnSpPr>
+            <p:cNvPr id="15" name="Straight Connector 14">
+              <a:extLst>
+                <a:ext uri="{FF2B5EF4-FFF2-40B4-BE49-F238E27FC236}">
+                  <a16:creationId xmlns:a16="http://schemas.microsoft.com/office/drawing/2014/main" id="{ED9A4545-DFF1-CCB1-A0CE-E40BEB15C6D6}"/>
+                </a:ext>
+              </a:extLst>
+            </p:cNvPr>
+            <p:cNvCxnSpPr>
+              <a:cxnSpLocks/>
+              <a:endCxn id="7" idx="3"/>
+            </p:cNvCxnSpPr>
+            <p:nvPr/>
+          </p:nvCxnSpPr>
+          <p:spPr>
+            <a:xfrm flipV="1">
+              <a:off x="6143223" y="1569580"/>
+              <a:ext cx="1321465" cy="1997868"/>
+            </a:xfrm>
+            <a:prstGeom prst="line">
+              <a:avLst/>
+            </a:prstGeom>
+            <a:ln>
+              <a:solidFill>
+                <a:srgbClr val="1D193D"/>
+              </a:solidFill>
+            </a:ln>
+          </p:spPr>
+          <p:style>
+            <a:lnRef idx="1">
+              <a:schemeClr val="accent1"/>
+            </a:lnRef>
+            <a:fillRef idx="0">
+              <a:schemeClr val="accent1"/>
+            </a:fillRef>
+            <a:effectRef idx="0">
+              <a:schemeClr val="accent1"/>
+            </a:effectRef>
+            <a:fontRef idx="minor">
+              <a:schemeClr val="tx1"/>
+            </a:fontRef>
+          </p:style>
+        </p:cxnSp>
+      </p:grpSp>
+      <p:grpSp>
+        <p:nvGrpSpPr>
+          <p:cNvPr id="64" name="Group 63">
+            <a:extLst>
+              <a:ext uri="{FF2B5EF4-FFF2-40B4-BE49-F238E27FC236}">
+                <a16:creationId xmlns:a16="http://schemas.microsoft.com/office/drawing/2014/main" id="{93AD3A0E-87AB-F9A2-4FE5-04BCF28E29CB}"/>
+              </a:ext>
+            </a:extLst>
+          </p:cNvPr>
+          <p:cNvGrpSpPr/>
+          <p:nvPr/>
+        </p:nvGrpSpPr>
+        <p:grpSpPr>
+          <a:xfrm>
+            <a:off x="6414349" y="1957576"/>
+            <a:ext cx="4481287" cy="1872744"/>
+            <a:chOff x="6414349" y="1957576"/>
+            <a:chExt cx="4481287" cy="1872744"/>
+          </a:xfrm>
+        </p:grpSpPr>
+        <p:sp>
+          <p:nvSpPr>
+            <p:cNvPr id="9" name="Oval 8">
+              <a:extLst>
+                <a:ext uri="{FF2B5EF4-FFF2-40B4-BE49-F238E27FC236}">
+                  <a16:creationId xmlns:a16="http://schemas.microsoft.com/office/drawing/2014/main" id="{52E40612-DEF7-D032-7F5C-0E3E2457B54C}"/>
+                </a:ext>
+              </a:extLst>
+            </p:cNvPr>
+            <p:cNvSpPr/>
+            <p:nvPr/>
+          </p:nvSpPr>
+          <p:spPr>
+            <a:xfrm>
+              <a:off x="9095265" y="1957576"/>
+              <a:ext cx="1800371" cy="1800371"/>
+            </a:xfrm>
+            <a:prstGeom prst="ellipse">
+              <a:avLst/>
+            </a:prstGeom>
+            <a:solidFill>
+              <a:srgbClr val="1D193D"/>
+            </a:solidFill>
+            <a:ln>
+              <a:noFill/>
+            </a:ln>
+          </p:spPr>
+          <p:style>
+            <a:lnRef idx="2">
+              <a:schemeClr val="accent1">
+                <a:shade val="15000"/>
+              </a:schemeClr>
+            </a:lnRef>
+            <a:fillRef idx="1">
+              <a:schemeClr val="accent1"/>
+            </a:fillRef>
+            <a:effectRef idx="0">
+              <a:schemeClr val="accent1"/>
+            </a:effectRef>
+            <a:fontRef idx="minor">
+              <a:schemeClr val="lt1"/>
+            </a:fontRef>
+          </p:style>
+          <p:txBody>
+            <a:bodyPr rtlCol="0" anchor="ctr"/>
+            <a:lstStyle/>
+            <a:p>
+              <a:pPr algn="ctr"/>
+              <a:r>
+                <a:rPr lang="en-US" dirty="0"/>
+                <a:t>Connection</a:t>
+              </a:r>
+            </a:p>
+          </p:txBody>
+        </p:sp>
+        <p:cxnSp>
+          <p:nvCxnSpPr>
+            <p:cNvPr id="21" name="Straight Connector 20">
+              <a:extLst>
+                <a:ext uri="{FF2B5EF4-FFF2-40B4-BE49-F238E27FC236}">
+                  <a16:creationId xmlns:a16="http://schemas.microsoft.com/office/drawing/2014/main" id="{D513DDB9-32F9-C86A-ADAF-04A3FA0A2B29}"/>
+                </a:ext>
+              </a:extLst>
+            </p:cNvPr>
+            <p:cNvCxnSpPr>
+              <a:cxnSpLocks/>
+              <a:endCxn id="9" idx="2"/>
+            </p:cNvCxnSpPr>
+            <p:nvPr/>
+          </p:nvCxnSpPr>
+          <p:spPr>
+            <a:xfrm flipV="1">
+              <a:off x="6414349" y="2857762"/>
+              <a:ext cx="2680916" cy="972558"/>
+            </a:xfrm>
+            <a:prstGeom prst="line">
+              <a:avLst/>
+            </a:prstGeom>
+            <a:ln>
+              <a:solidFill>
+                <a:srgbClr val="1D193D"/>
+              </a:solidFill>
+            </a:ln>
+          </p:spPr>
+          <p:style>
+            <a:lnRef idx="1">
+              <a:schemeClr val="accent1"/>
+            </a:lnRef>
+            <a:fillRef idx="0">
+              <a:schemeClr val="accent1"/>
+            </a:fillRef>
+            <a:effectRef idx="0">
+              <a:schemeClr val="accent1"/>
+            </a:effectRef>
+            <a:fontRef idx="minor">
+              <a:schemeClr val="tx1"/>
+            </a:fontRef>
+          </p:style>
+        </p:cxnSp>
+      </p:grpSp>
+      <p:grpSp>
+        <p:nvGrpSpPr>
+          <p:cNvPr id="70" name="Group 69">
+            <a:extLst>
+              <a:ext uri="{FF2B5EF4-FFF2-40B4-BE49-F238E27FC236}">
+                <a16:creationId xmlns:a16="http://schemas.microsoft.com/office/drawing/2014/main" id="{DB134096-01BC-BB62-F75B-DD221B26DB02}"/>
+              </a:ext>
+            </a:extLst>
+          </p:cNvPr>
+          <p:cNvGrpSpPr/>
+          <p:nvPr/>
+        </p:nvGrpSpPr>
+        <p:grpSpPr>
+          <a:xfrm>
+            <a:off x="6373707" y="4199112"/>
+            <a:ext cx="4831478" cy="1814735"/>
+            <a:chOff x="6373707" y="4199112"/>
+            <a:chExt cx="4831478" cy="1814735"/>
+          </a:xfrm>
+        </p:grpSpPr>
+        <p:sp>
+          <p:nvSpPr>
+            <p:cNvPr id="10" name="Oval 9">
+              <a:extLst>
+                <a:ext uri="{FF2B5EF4-FFF2-40B4-BE49-F238E27FC236}">
+                  <a16:creationId xmlns:a16="http://schemas.microsoft.com/office/drawing/2014/main" id="{212D494D-C30D-5BBA-5195-FBAB3B309E0D}"/>
+                </a:ext>
+              </a:extLst>
+            </p:cNvPr>
+            <p:cNvSpPr/>
+            <p:nvPr/>
+          </p:nvSpPr>
+          <p:spPr>
+            <a:xfrm>
+              <a:off x="10171936" y="4980598"/>
+              <a:ext cx="1033249" cy="1033249"/>
+            </a:xfrm>
+            <a:prstGeom prst="ellipse">
+              <a:avLst/>
+            </a:prstGeom>
+            <a:solidFill>
+              <a:srgbClr val="1D193D"/>
+            </a:solidFill>
+            <a:ln>
+              <a:noFill/>
+            </a:ln>
+          </p:spPr>
+          <p:style>
+            <a:lnRef idx="2">
+              <a:schemeClr val="accent1">
+                <a:shade val="15000"/>
+              </a:schemeClr>
+            </a:lnRef>
+            <a:fillRef idx="1">
+              <a:schemeClr val="accent1"/>
+            </a:fillRef>
+            <a:effectRef idx="0">
+              <a:schemeClr val="accent1"/>
+            </a:effectRef>
+            <a:fontRef idx="minor">
+              <a:schemeClr val="lt1"/>
+            </a:fontRef>
+          </p:style>
+          <p:txBody>
+            <a:bodyPr rtlCol="0" anchor="ctr"/>
+            <a:lstStyle/>
+            <a:p>
+              <a:pPr algn="ctr"/>
+              <a:r>
+                <a:rPr lang="en-US" u="sng" dirty="0"/>
+                <a:t>Voice</a:t>
+              </a:r>
+            </a:p>
+          </p:txBody>
+        </p:sp>
+        <p:cxnSp>
+          <p:nvCxnSpPr>
+            <p:cNvPr id="24" name="Straight Connector 23">
+              <a:extLst>
+                <a:ext uri="{FF2B5EF4-FFF2-40B4-BE49-F238E27FC236}">
+                  <a16:creationId xmlns:a16="http://schemas.microsoft.com/office/drawing/2014/main" id="{75C75555-BF2E-2030-D856-40895A50A7C6}"/>
+                </a:ext>
+              </a:extLst>
+            </p:cNvPr>
+            <p:cNvCxnSpPr>
+              <a:cxnSpLocks/>
+              <a:endCxn id="10" idx="2"/>
+            </p:cNvCxnSpPr>
+            <p:nvPr/>
+          </p:nvCxnSpPr>
+          <p:spPr>
+            <a:xfrm>
+              <a:off x="6373707" y="4199112"/>
+              <a:ext cx="3798229" cy="1298111"/>
+            </a:xfrm>
+            <a:prstGeom prst="line">
+              <a:avLst/>
+            </a:prstGeom>
+            <a:ln>
+              <a:solidFill>
+                <a:srgbClr val="1D193D"/>
+              </a:solidFill>
+            </a:ln>
+          </p:spPr>
+          <p:style>
+            <a:lnRef idx="1">
+              <a:schemeClr val="accent1"/>
+            </a:lnRef>
+            <a:fillRef idx="0">
+              <a:schemeClr val="accent1"/>
+            </a:fillRef>
+            <a:effectRef idx="0">
+              <a:schemeClr val="accent1"/>
+            </a:effectRef>
+            <a:fontRef idx="minor">
+              <a:schemeClr val="tx1"/>
+            </a:fontRef>
+          </p:style>
+        </p:cxnSp>
+      </p:grpSp>
+      <p:grpSp>
+        <p:nvGrpSpPr>
+          <p:cNvPr id="66" name="Group 65">
+            <a:extLst>
+              <a:ext uri="{FF2B5EF4-FFF2-40B4-BE49-F238E27FC236}">
+                <a16:creationId xmlns:a16="http://schemas.microsoft.com/office/drawing/2014/main" id="{BB54EFB0-52F1-8839-E3F7-B4C1589355D0}"/>
+              </a:ext>
+            </a:extLst>
+          </p:cNvPr>
+          <p:cNvGrpSpPr/>
+          <p:nvPr/>
+        </p:nvGrpSpPr>
+        <p:grpSpPr>
+          <a:xfrm>
+            <a:off x="6414349" y="4273973"/>
+            <a:ext cx="3170682" cy="2314085"/>
+            <a:chOff x="6414349" y="4273973"/>
+            <a:chExt cx="3170682" cy="2314085"/>
+          </a:xfrm>
+        </p:grpSpPr>
+        <p:sp>
+          <p:nvSpPr>
+            <p:cNvPr id="12" name="Oval 11">
+              <a:extLst>
+                <a:ext uri="{FF2B5EF4-FFF2-40B4-BE49-F238E27FC236}">
+                  <a16:creationId xmlns:a16="http://schemas.microsoft.com/office/drawing/2014/main" id="{54FA88FD-1C5D-8A62-62AB-A0A127447AF5}"/>
+                </a:ext>
+              </a:extLst>
+            </p:cNvPr>
+            <p:cNvSpPr/>
+            <p:nvPr/>
+          </p:nvSpPr>
+          <p:spPr>
+            <a:xfrm>
+              <a:off x="8349891" y="5328213"/>
+              <a:ext cx="1235140" cy="1259845"/>
+            </a:xfrm>
+            <a:prstGeom prst="ellipse">
+              <a:avLst/>
+            </a:prstGeom>
+            <a:solidFill>
+              <a:srgbClr val="1D193D"/>
+            </a:solidFill>
+            <a:ln>
+              <a:noFill/>
+            </a:ln>
+          </p:spPr>
+          <p:style>
+            <a:lnRef idx="2">
+              <a:schemeClr val="accent1">
+                <a:shade val="15000"/>
+              </a:schemeClr>
+            </a:lnRef>
+            <a:fillRef idx="1">
+              <a:schemeClr val="accent1"/>
+            </a:fillRef>
+            <a:effectRef idx="0">
+              <a:schemeClr val="accent1"/>
+            </a:effectRef>
+            <a:fontRef idx="minor">
+              <a:schemeClr val="lt1"/>
+            </a:fontRef>
+          </p:style>
+          <p:txBody>
+            <a:bodyPr rtlCol="0" anchor="ctr"/>
+            <a:lstStyle/>
+            <a:p>
+              <a:pPr algn="ctr"/>
+              <a:r>
+                <a:rPr lang="en-US" dirty="0"/>
+                <a:t>Images</a:t>
+              </a:r>
+            </a:p>
+          </p:txBody>
+        </p:sp>
+        <p:cxnSp>
+          <p:nvCxnSpPr>
+            <p:cNvPr id="27" name="Straight Connector 26">
+              <a:extLst>
+                <a:ext uri="{FF2B5EF4-FFF2-40B4-BE49-F238E27FC236}">
+                  <a16:creationId xmlns:a16="http://schemas.microsoft.com/office/drawing/2014/main" id="{6A11B120-6F11-E7CA-54DD-67CAE2986D50}"/>
+                </a:ext>
+              </a:extLst>
+            </p:cNvPr>
+            <p:cNvCxnSpPr>
+              <a:cxnSpLocks/>
+              <a:endCxn id="12" idx="2"/>
+            </p:cNvCxnSpPr>
+            <p:nvPr/>
+          </p:nvCxnSpPr>
+          <p:spPr>
+            <a:xfrm>
+              <a:off x="7003627" y="5875867"/>
+              <a:ext cx="1346264" cy="82269"/>
+            </a:xfrm>
+            <a:prstGeom prst="line">
+              <a:avLst/>
+            </a:prstGeom>
+            <a:ln>
+              <a:solidFill>
+                <a:srgbClr val="1D193D"/>
+              </a:solidFill>
+            </a:ln>
+          </p:spPr>
+          <p:style>
+            <a:lnRef idx="1">
+              <a:schemeClr val="accent1"/>
+            </a:lnRef>
+            <a:fillRef idx="0">
+              <a:schemeClr val="accent1"/>
+            </a:fillRef>
+            <a:effectRef idx="0">
+              <a:schemeClr val="accent1"/>
+            </a:effectRef>
+            <a:fontRef idx="minor">
+              <a:schemeClr val="tx1"/>
+            </a:fontRef>
+          </p:style>
+        </p:cxnSp>
+        <p:cxnSp>
+          <p:nvCxnSpPr>
+            <p:cNvPr id="33" name="Straight Connector 32">
+              <a:extLst>
+                <a:ext uri="{FF2B5EF4-FFF2-40B4-BE49-F238E27FC236}">
+                  <a16:creationId xmlns:a16="http://schemas.microsoft.com/office/drawing/2014/main" id="{AF2C4F3F-D39A-2954-17B7-5D7CFEB11A7E}"/>
+                </a:ext>
+              </a:extLst>
+            </p:cNvPr>
+            <p:cNvCxnSpPr>
+              <a:cxnSpLocks/>
+            </p:cNvCxnSpPr>
+            <p:nvPr/>
+          </p:nvCxnSpPr>
+          <p:spPr>
+            <a:xfrm>
+              <a:off x="6414349" y="4273973"/>
+              <a:ext cx="589278" cy="1601894"/>
+            </a:xfrm>
+            <a:prstGeom prst="line">
+              <a:avLst/>
+            </a:prstGeom>
+            <a:ln>
+              <a:solidFill>
+                <a:srgbClr val="1D193D"/>
+              </a:solidFill>
+            </a:ln>
+          </p:spPr>
+          <p:style>
+            <a:lnRef idx="1">
+              <a:schemeClr val="accent1"/>
+            </a:lnRef>
+            <a:fillRef idx="0">
+              <a:schemeClr val="accent1"/>
+            </a:fillRef>
+            <a:effectRef idx="0">
+              <a:schemeClr val="accent1"/>
+            </a:effectRef>
+            <a:fontRef idx="minor">
+              <a:schemeClr val="tx1"/>
+            </a:fontRef>
+          </p:style>
+        </p:cxnSp>
+      </p:grpSp>
+      <p:grpSp>
+        <p:nvGrpSpPr>
+          <p:cNvPr id="61" name="Group 60">
+            <a:extLst>
+              <a:ext uri="{FF2B5EF4-FFF2-40B4-BE49-F238E27FC236}">
+                <a16:creationId xmlns:a16="http://schemas.microsoft.com/office/drawing/2014/main" id="{FF11F8DD-6046-7FD7-F7A1-8925DEEFCA89}"/>
+              </a:ext>
+            </a:extLst>
+          </p:cNvPr>
+          <p:cNvGrpSpPr/>
+          <p:nvPr/>
+        </p:nvGrpSpPr>
+        <p:grpSpPr>
           <a:xfrm>
             <a:off x="1886053" y="1858701"/>
-            <a:ext cx="1396678" cy="1396678"/>
+            <a:ext cx="3762907" cy="1829379"/>
+            <a:chOff x="1886053" y="1858701"/>
+            <a:chExt cx="3762907" cy="1829379"/>
           </a:xfrm>
-          <a:prstGeom prst="ellipse">
-            <a:avLst/>
-          </a:prstGeom>
-          <a:solidFill>
-            <a:srgbClr val="1D193D"/>
-          </a:solidFill>
-          <a:ln>
-            <a:noFill/>
-          </a:ln>
-        </p:spPr>
-        <p:style>
-          <a:lnRef idx="2">
-            <a:schemeClr val="accent1">
-              <a:shade val="15000"/>
-            </a:schemeClr>
-          </a:lnRef>
-          <a:fillRef idx="1">
-            <a:schemeClr val="accent1"/>
-          </a:fillRef>
-          <a:effectRef idx="0">
-            <a:schemeClr val="accent1"/>
-          </a:effectRef>
-          <a:fontRef idx="minor">
-            <a:schemeClr val="lt1"/>
-          </a:fontRef>
-        </p:style>
-        <p:txBody>
-          <a:bodyPr rtlCol="0" anchor="ctr"/>
-          <a:lstStyle/>
-          <a:p>
-            <a:pPr algn="ctr"/>
-            <a:r>
-              <a:rPr lang="en-US" dirty="0"/>
-              <a:t>Personal</a:t>
-            </a:r>
-          </a:p>
-        </p:txBody>
-      </p:sp>
-      <p:sp>
-        <p:nvSpPr>
-          <p:cNvPr id="7" name="Oval 6">
-            <a:extLst>
-              <a:ext uri="{FF2B5EF4-FFF2-40B4-BE49-F238E27FC236}">
-                <a16:creationId xmlns:a16="http://schemas.microsoft.com/office/drawing/2014/main" id="{8EB88608-8E9E-53AC-1B55-0E704B28C2F4}"/>
-              </a:ext>
-            </a:extLst>
-          </p:cNvPr>
-          <p:cNvSpPr/>
+        </p:grpSpPr>
+        <p:sp>
+          <p:nvSpPr>
+            <p:cNvPr id="6" name="Oval 5">
+              <a:extLst>
+                <a:ext uri="{FF2B5EF4-FFF2-40B4-BE49-F238E27FC236}">
+                  <a16:creationId xmlns:a16="http://schemas.microsoft.com/office/drawing/2014/main" id="{B591B657-BBE1-C50C-BEE9-AA349B9EEE42}"/>
+                </a:ext>
+              </a:extLst>
+            </p:cNvPr>
+            <p:cNvSpPr/>
+            <p:nvPr/>
+          </p:nvSpPr>
+          <p:spPr>
+            <a:xfrm>
+              <a:off x="1886053" y="1858701"/>
+              <a:ext cx="1396678" cy="1396678"/>
+            </a:xfrm>
+            <a:prstGeom prst="ellipse">
+              <a:avLst/>
+            </a:prstGeom>
+            <a:solidFill>
+              <a:srgbClr val="1D193D"/>
+            </a:solidFill>
+            <a:ln>
+              <a:noFill/>
+            </a:ln>
+          </p:spPr>
+          <p:style>
+            <a:lnRef idx="2">
+              <a:schemeClr val="accent1">
+                <a:shade val="15000"/>
+              </a:schemeClr>
+            </a:lnRef>
+            <a:fillRef idx="1">
+              <a:schemeClr val="accent1"/>
+            </a:fillRef>
+            <a:effectRef idx="0">
+              <a:schemeClr val="accent1"/>
+            </a:effectRef>
+            <a:fontRef idx="minor">
+              <a:schemeClr val="lt1"/>
+            </a:fontRef>
+          </p:style>
+          <p:txBody>
+            <a:bodyPr rtlCol="0" anchor="ctr"/>
+            <a:lstStyle/>
+            <a:p>
+              <a:pPr algn="ctr"/>
+              <a:r>
+                <a:rPr lang="en-US" dirty="0"/>
+                <a:t>Personal</a:t>
+              </a:r>
+            </a:p>
+          </p:txBody>
+        </p:sp>
+        <p:cxnSp>
+          <p:nvCxnSpPr>
+            <p:cNvPr id="39" name="Straight Connector 38">
+              <a:extLst>
+                <a:ext uri="{FF2B5EF4-FFF2-40B4-BE49-F238E27FC236}">
+                  <a16:creationId xmlns:a16="http://schemas.microsoft.com/office/drawing/2014/main" id="{2E5BEE8D-A06C-4459-631E-9376AFD79829}"/>
+                </a:ext>
+              </a:extLst>
+            </p:cNvPr>
+            <p:cNvCxnSpPr>
+              <a:cxnSpLocks/>
+              <a:endCxn id="6" idx="5"/>
+            </p:cNvCxnSpPr>
+            <p:nvPr/>
+          </p:nvCxnSpPr>
+          <p:spPr>
+            <a:xfrm flipH="1" flipV="1">
+              <a:off x="3078192" y="3050840"/>
+              <a:ext cx="2570768" cy="637240"/>
+            </a:xfrm>
+            <a:prstGeom prst="line">
+              <a:avLst/>
+            </a:prstGeom>
+            <a:ln>
+              <a:solidFill>
+                <a:srgbClr val="1D193D"/>
+              </a:solidFill>
+            </a:ln>
+          </p:spPr>
+          <p:style>
+            <a:lnRef idx="1">
+              <a:schemeClr val="accent1"/>
+            </a:lnRef>
+            <a:fillRef idx="0">
+              <a:schemeClr val="accent1"/>
+            </a:fillRef>
+            <a:effectRef idx="0">
+              <a:schemeClr val="accent1"/>
+            </a:effectRef>
+            <a:fontRef idx="minor">
+              <a:schemeClr val="tx1"/>
+            </a:fontRef>
+          </p:style>
+        </p:cxnSp>
+      </p:grpSp>
+      <p:grpSp>
+        <p:nvGrpSpPr>
+          <p:cNvPr id="59" name="Group 58">
+            <a:extLst>
+              <a:ext uri="{FF2B5EF4-FFF2-40B4-BE49-F238E27FC236}">
+                <a16:creationId xmlns:a16="http://schemas.microsoft.com/office/drawing/2014/main" id="{DBADDA7C-B268-EBDD-BEDF-9A907579E7FA}"/>
+              </a:ext>
+            </a:extLst>
+          </p:cNvPr>
+          <p:cNvGrpSpPr/>
           <p:nvPr/>
-        </p:nvSpPr>
-        <p:spPr>
-          <a:xfrm>
-            <a:off x="7276111" y="470475"/>
-            <a:ext cx="1287682" cy="1287682"/>
-          </a:xfrm>
-          <a:prstGeom prst="ellipse">
-            <a:avLst/>
-          </a:prstGeom>
-          <a:solidFill>
-            <a:srgbClr val="1D193D"/>
-          </a:solidFill>
-          <a:ln>
-            <a:noFill/>
-          </a:ln>
-        </p:spPr>
-        <p:style>
-          <a:lnRef idx="2">
-            <a:schemeClr val="accent1">
-              <a:shade val="15000"/>
-            </a:schemeClr>
-          </a:lnRef>
-          <a:fillRef idx="1">
-            <a:schemeClr val="accent1"/>
-          </a:fillRef>
-          <a:effectRef idx="0">
-            <a:schemeClr val="accent1"/>
-          </a:effectRef>
-          <a:fontRef idx="minor">
-            <a:schemeClr val="lt1"/>
-          </a:fontRef>
-        </p:style>
-        <p:txBody>
-          <a:bodyPr rtlCol="0" anchor="ctr"/>
-          <a:lstStyle/>
-          <a:p>
-            <a:pPr algn="ctr"/>
-            <a:r>
-              <a:rPr lang="en-US" dirty="0"/>
-              <a:t>Sensors</a:t>
-            </a:r>
-          </a:p>
-        </p:txBody>
-      </p:sp>
-      <p:sp>
-        <p:nvSpPr>
-          <p:cNvPr id="8" name="Oval 7">
-            <a:extLst>
-              <a:ext uri="{FF2B5EF4-FFF2-40B4-BE49-F238E27FC236}">
-                <a16:creationId xmlns:a16="http://schemas.microsoft.com/office/drawing/2014/main" id="{6E5FA137-B1B0-08E4-C34E-F563407FCD1D}"/>
-              </a:ext>
-            </a:extLst>
-          </p:cNvPr>
-          <p:cNvSpPr/>
-          <p:nvPr/>
-        </p:nvSpPr>
-        <p:spPr>
+        </p:nvGrpSpPr>
+        <p:grpSpPr>
           <a:xfrm>
             <a:off x="1732345" y="4068038"/>
-            <a:ext cx="912560" cy="912560"/>
+            <a:ext cx="3869202" cy="912560"/>
+            <a:chOff x="1732345" y="4068038"/>
+            <a:chExt cx="3869202" cy="912560"/>
           </a:xfrm>
-          <a:prstGeom prst="ellipse">
-            <a:avLst/>
-          </a:prstGeom>
-          <a:solidFill>
-            <a:srgbClr val="1D193D"/>
-          </a:solidFill>
-          <a:ln>
-            <a:noFill/>
-          </a:ln>
-        </p:spPr>
-        <p:style>
-          <a:lnRef idx="2">
-            <a:schemeClr val="accent1">
-              <a:shade val="15000"/>
-            </a:schemeClr>
-          </a:lnRef>
-          <a:fillRef idx="1">
-            <a:schemeClr val="accent1"/>
-          </a:fillRef>
-          <a:effectRef idx="0">
-            <a:schemeClr val="accent1"/>
-          </a:effectRef>
-          <a:fontRef idx="minor">
-            <a:schemeClr val="lt1"/>
-          </a:fontRef>
-        </p:style>
-        <p:txBody>
-          <a:bodyPr rtlCol="0" anchor="ctr"/>
-          <a:lstStyle/>
-          <a:p>
-            <a:pPr algn="ctr"/>
-            <a:r>
-              <a:rPr lang="en-US" dirty="0"/>
-              <a:t>Logs</a:t>
-            </a:r>
-          </a:p>
-        </p:txBody>
-      </p:sp>
-      <p:sp>
-        <p:nvSpPr>
-          <p:cNvPr id="9" name="Oval 8">
-            <a:extLst>
-              <a:ext uri="{FF2B5EF4-FFF2-40B4-BE49-F238E27FC236}">
-                <a16:creationId xmlns:a16="http://schemas.microsoft.com/office/drawing/2014/main" id="{52E40612-DEF7-D032-7F5C-0E3E2457B54C}"/>
-              </a:ext>
-            </a:extLst>
-          </p:cNvPr>
-          <p:cNvSpPr/>
+        </p:grpSpPr>
+        <p:sp>
+          <p:nvSpPr>
+            <p:cNvPr id="8" name="Oval 7">
+              <a:extLst>
+                <a:ext uri="{FF2B5EF4-FFF2-40B4-BE49-F238E27FC236}">
+                  <a16:creationId xmlns:a16="http://schemas.microsoft.com/office/drawing/2014/main" id="{6E5FA137-B1B0-08E4-C34E-F563407FCD1D}"/>
+                </a:ext>
+              </a:extLst>
+            </p:cNvPr>
+            <p:cNvSpPr/>
+            <p:nvPr/>
+          </p:nvSpPr>
+          <p:spPr>
+            <a:xfrm>
+              <a:off x="1732345" y="4068038"/>
+              <a:ext cx="912560" cy="912560"/>
+            </a:xfrm>
+            <a:prstGeom prst="ellipse">
+              <a:avLst/>
+            </a:prstGeom>
+            <a:solidFill>
+              <a:srgbClr val="1D193D"/>
+            </a:solidFill>
+            <a:ln>
+              <a:noFill/>
+            </a:ln>
+          </p:spPr>
+          <p:style>
+            <a:lnRef idx="2">
+              <a:schemeClr val="accent1">
+                <a:shade val="15000"/>
+              </a:schemeClr>
+            </a:lnRef>
+            <a:fillRef idx="1">
+              <a:schemeClr val="accent1"/>
+            </a:fillRef>
+            <a:effectRef idx="0">
+              <a:schemeClr val="accent1"/>
+            </a:effectRef>
+            <a:fontRef idx="minor">
+              <a:schemeClr val="lt1"/>
+            </a:fontRef>
+          </p:style>
+          <p:txBody>
+            <a:bodyPr rtlCol="0" anchor="ctr"/>
+            <a:lstStyle/>
+            <a:p>
+              <a:pPr algn="ctr"/>
+              <a:r>
+                <a:rPr lang="en-US" dirty="0"/>
+                <a:t>Logs</a:t>
+              </a:r>
+            </a:p>
+          </p:txBody>
+        </p:sp>
+        <p:cxnSp>
+          <p:nvCxnSpPr>
+            <p:cNvPr id="42" name="Straight Connector 41">
+              <a:extLst>
+                <a:ext uri="{FF2B5EF4-FFF2-40B4-BE49-F238E27FC236}">
+                  <a16:creationId xmlns:a16="http://schemas.microsoft.com/office/drawing/2014/main" id="{F911253D-21CD-0130-6CA6-8DD35F379ACD}"/>
+                </a:ext>
+              </a:extLst>
+            </p:cNvPr>
+            <p:cNvCxnSpPr>
+              <a:cxnSpLocks/>
+              <a:endCxn id="8" idx="5"/>
+            </p:cNvCxnSpPr>
+            <p:nvPr/>
+          </p:nvCxnSpPr>
+          <p:spPr>
+            <a:xfrm flipH="1">
+              <a:off x="2511264" y="4765040"/>
+              <a:ext cx="1759323" cy="81917"/>
+            </a:xfrm>
+            <a:prstGeom prst="line">
+              <a:avLst/>
+            </a:prstGeom>
+            <a:ln>
+              <a:solidFill>
+                <a:srgbClr val="1D193D"/>
+              </a:solidFill>
+            </a:ln>
+          </p:spPr>
+          <p:style>
+            <a:lnRef idx="1">
+              <a:schemeClr val="accent1"/>
+            </a:lnRef>
+            <a:fillRef idx="0">
+              <a:schemeClr val="accent1"/>
+            </a:fillRef>
+            <a:effectRef idx="0">
+              <a:schemeClr val="accent1"/>
+            </a:effectRef>
+            <a:fontRef idx="minor">
+              <a:schemeClr val="tx1"/>
+            </a:fontRef>
+          </p:style>
+        </p:cxnSp>
+        <p:cxnSp>
+          <p:nvCxnSpPr>
+            <p:cNvPr id="45" name="Straight Connector 44">
+              <a:extLst>
+                <a:ext uri="{FF2B5EF4-FFF2-40B4-BE49-F238E27FC236}">
+                  <a16:creationId xmlns:a16="http://schemas.microsoft.com/office/drawing/2014/main" id="{B567F669-8FA6-1AE0-D273-8660731FBC3F}"/>
+                </a:ext>
+              </a:extLst>
+            </p:cNvPr>
+            <p:cNvCxnSpPr>
+              <a:cxnSpLocks/>
+            </p:cNvCxnSpPr>
+            <p:nvPr/>
+          </p:nvCxnSpPr>
+          <p:spPr>
+            <a:xfrm flipH="1">
+              <a:off x="4270587" y="4177607"/>
+              <a:ext cx="1330960" cy="587433"/>
+            </a:xfrm>
+            <a:prstGeom prst="line">
+              <a:avLst/>
+            </a:prstGeom>
+            <a:ln>
+              <a:solidFill>
+                <a:srgbClr val="1D193D"/>
+              </a:solidFill>
+            </a:ln>
+          </p:spPr>
+          <p:style>
+            <a:lnRef idx="1">
+              <a:schemeClr val="accent1"/>
+            </a:lnRef>
+            <a:fillRef idx="0">
+              <a:schemeClr val="accent1"/>
+            </a:fillRef>
+            <a:effectRef idx="0">
+              <a:schemeClr val="accent1"/>
+            </a:effectRef>
+            <a:fontRef idx="minor">
+              <a:schemeClr val="tx1"/>
+            </a:fontRef>
+          </p:style>
+        </p:cxnSp>
+      </p:grpSp>
+      <p:grpSp>
+        <p:nvGrpSpPr>
+          <p:cNvPr id="60" name="Group 59">
+            <a:extLst>
+              <a:ext uri="{FF2B5EF4-FFF2-40B4-BE49-F238E27FC236}">
+                <a16:creationId xmlns:a16="http://schemas.microsoft.com/office/drawing/2014/main" id="{EB0C30D6-8C92-E088-A858-7262CC9E0A76}"/>
+              </a:ext>
+            </a:extLst>
+          </p:cNvPr>
+          <p:cNvGrpSpPr/>
           <p:nvPr/>
-        </p:nvSpPr>
-        <p:spPr>
+        </p:nvGrpSpPr>
+        <p:grpSpPr>
           <a:xfrm>
-            <a:off x="9095265" y="1957576"/>
-            <a:ext cx="1800371" cy="1800371"/>
+            <a:off x="2520478" y="4765040"/>
+            <a:ext cx="1758364" cy="1917410"/>
+            <a:chOff x="2520478" y="4765040"/>
+            <a:chExt cx="1758364" cy="1917410"/>
           </a:xfrm>
-          <a:prstGeom prst="ellipse">
-            <a:avLst/>
-          </a:prstGeom>
-          <a:solidFill>
-            <a:srgbClr val="1D193D"/>
-          </a:solidFill>
-          <a:ln>
-            <a:noFill/>
-          </a:ln>
-        </p:spPr>
-        <p:style>
-          <a:lnRef idx="2">
-            <a:schemeClr val="accent1">
-              <a:shade val="15000"/>
-            </a:schemeClr>
-          </a:lnRef>
-          <a:fillRef idx="1">
-            <a:schemeClr val="accent1"/>
-          </a:fillRef>
-          <a:effectRef idx="0">
-            <a:schemeClr val="accent1"/>
-          </a:effectRef>
-          <a:fontRef idx="minor">
-            <a:schemeClr val="lt1"/>
-          </a:fontRef>
-        </p:style>
-        <p:txBody>
-          <a:bodyPr rtlCol="0" anchor="ctr"/>
-          <a:lstStyle/>
-          <a:p>
-            <a:pPr algn="ctr"/>
-            <a:r>
-              <a:rPr lang="en-US" dirty="0"/>
-              <a:t>Connection</a:t>
-            </a:r>
-          </a:p>
-        </p:txBody>
-      </p:sp>
-      <p:sp>
-        <p:nvSpPr>
-          <p:cNvPr id="10" name="Oval 9">
-            <a:extLst>
-              <a:ext uri="{FF2B5EF4-FFF2-40B4-BE49-F238E27FC236}">
-                <a16:creationId xmlns:a16="http://schemas.microsoft.com/office/drawing/2014/main" id="{212D494D-C30D-5BBA-5195-FBAB3B309E0D}"/>
-              </a:ext>
-            </a:extLst>
-          </p:cNvPr>
-          <p:cNvSpPr/>
+        </p:grpSpPr>
+        <p:sp>
+          <p:nvSpPr>
+            <p:cNvPr id="11" name="Oval 10">
+              <a:extLst>
+                <a:ext uri="{FF2B5EF4-FFF2-40B4-BE49-F238E27FC236}">
+                  <a16:creationId xmlns:a16="http://schemas.microsoft.com/office/drawing/2014/main" id="{35562F2B-0B86-BEF3-AB9F-1573F3CEBC1C}"/>
+                </a:ext>
+              </a:extLst>
+            </p:cNvPr>
+            <p:cNvSpPr/>
+            <p:nvPr/>
+          </p:nvSpPr>
+          <p:spPr>
+            <a:xfrm>
+              <a:off x="2520478" y="5115535"/>
+              <a:ext cx="1524507" cy="1566915"/>
+            </a:xfrm>
+            <a:prstGeom prst="ellipse">
+              <a:avLst/>
+            </a:prstGeom>
+            <a:solidFill>
+              <a:srgbClr val="1D193D"/>
+            </a:solidFill>
+            <a:ln>
+              <a:noFill/>
+            </a:ln>
+          </p:spPr>
+          <p:style>
+            <a:lnRef idx="2">
+              <a:schemeClr val="accent1">
+                <a:shade val="15000"/>
+              </a:schemeClr>
+            </a:lnRef>
+            <a:fillRef idx="1">
+              <a:schemeClr val="accent1"/>
+            </a:fillRef>
+            <a:effectRef idx="0">
+              <a:schemeClr val="accent1"/>
+            </a:effectRef>
+            <a:fontRef idx="minor">
+              <a:schemeClr val="lt1"/>
+            </a:fontRef>
+          </p:style>
+          <p:txBody>
+            <a:bodyPr rtlCol="0" anchor="ctr"/>
+            <a:lstStyle/>
+            <a:p>
+              <a:pPr algn="ctr"/>
+              <a:r>
+                <a:rPr lang="en-US" dirty="0"/>
+                <a:t>Text messages</a:t>
+              </a:r>
+            </a:p>
+          </p:txBody>
+        </p:sp>
+        <p:cxnSp>
+          <p:nvCxnSpPr>
+            <p:cNvPr id="49" name="Straight Connector 48">
+              <a:extLst>
+                <a:ext uri="{FF2B5EF4-FFF2-40B4-BE49-F238E27FC236}">
+                  <a16:creationId xmlns:a16="http://schemas.microsoft.com/office/drawing/2014/main" id="{BD997A88-0FB7-4910-117D-99715A488E3B}"/>
+                </a:ext>
+              </a:extLst>
+            </p:cNvPr>
+            <p:cNvCxnSpPr>
+              <a:cxnSpLocks/>
+              <a:endCxn id="11" idx="7"/>
+            </p:cNvCxnSpPr>
+            <p:nvPr/>
+          </p:nvCxnSpPr>
+          <p:spPr>
+            <a:xfrm flipH="1">
+              <a:off x="3821726" y="4765040"/>
+              <a:ext cx="457116" cy="579964"/>
+            </a:xfrm>
+            <a:prstGeom prst="line">
+              <a:avLst/>
+            </a:prstGeom>
+            <a:ln>
+              <a:solidFill>
+                <a:srgbClr val="1D193D"/>
+              </a:solidFill>
+            </a:ln>
+          </p:spPr>
+          <p:style>
+            <a:lnRef idx="1">
+              <a:schemeClr val="accent1"/>
+            </a:lnRef>
+            <a:fillRef idx="0">
+              <a:schemeClr val="accent1"/>
+            </a:fillRef>
+            <a:effectRef idx="0">
+              <a:schemeClr val="accent1"/>
+            </a:effectRef>
+            <a:fontRef idx="minor">
+              <a:schemeClr val="tx1"/>
+            </a:fontRef>
+          </p:style>
+        </p:cxnSp>
+      </p:grpSp>
+      <p:grpSp>
+        <p:nvGrpSpPr>
+          <p:cNvPr id="62" name="Group 61">
+            <a:extLst>
+              <a:ext uri="{FF2B5EF4-FFF2-40B4-BE49-F238E27FC236}">
+                <a16:creationId xmlns:a16="http://schemas.microsoft.com/office/drawing/2014/main" id="{C107EE13-FCA3-1896-B728-EFD8443625EE}"/>
+              </a:ext>
+            </a:extLst>
+          </p:cNvPr>
+          <p:cNvGrpSpPr/>
           <p:nvPr/>
-        </p:nvSpPr>
-        <p:spPr>
-          <a:xfrm>
-            <a:off x="9749235" y="4177607"/>
-            <a:ext cx="1033249" cy="1033249"/>
-          </a:xfrm>
-          <a:prstGeom prst="ellipse">
-            <a:avLst/>
-          </a:prstGeom>
-          <a:solidFill>
-            <a:srgbClr val="1D193D"/>
-          </a:solidFill>
-          <a:ln>
-            <a:noFill/>
-          </a:ln>
-        </p:spPr>
-        <p:style>
-          <a:lnRef idx="2">
-            <a:schemeClr val="accent1">
-              <a:shade val="15000"/>
-            </a:schemeClr>
-          </a:lnRef>
-          <a:fillRef idx="1">
-            <a:schemeClr val="accent1"/>
-          </a:fillRef>
-          <a:effectRef idx="0">
-            <a:schemeClr val="accent1"/>
-          </a:effectRef>
-          <a:fontRef idx="minor">
-            <a:schemeClr val="lt1"/>
-          </a:fontRef>
-        </p:style>
-        <p:txBody>
-          <a:bodyPr rtlCol="0" anchor="ctr"/>
-          <a:lstStyle/>
-          <a:p>
-            <a:pPr algn="ctr"/>
-            <a:r>
-              <a:rPr lang="en-US" dirty="0"/>
-              <a:t>Voice</a:t>
-            </a:r>
-          </a:p>
-        </p:txBody>
-      </p:sp>
-      <p:sp>
-        <p:nvSpPr>
-          <p:cNvPr id="11" name="Oval 10">
-            <a:extLst>
-              <a:ext uri="{FF2B5EF4-FFF2-40B4-BE49-F238E27FC236}">
-                <a16:creationId xmlns:a16="http://schemas.microsoft.com/office/drawing/2014/main" id="{35562F2B-0B86-BEF3-AB9F-1573F3CEBC1C}"/>
-              </a:ext>
-            </a:extLst>
-          </p:cNvPr>
-          <p:cNvSpPr/>
-          <p:nvPr/>
-        </p:nvSpPr>
-        <p:spPr>
-          <a:xfrm>
-            <a:off x="2520478" y="5115535"/>
-            <a:ext cx="1524507" cy="1566915"/>
-          </a:xfrm>
-          <a:prstGeom prst="ellipse">
-            <a:avLst/>
-          </a:prstGeom>
-          <a:solidFill>
-            <a:srgbClr val="1D193D"/>
-          </a:solidFill>
-          <a:ln>
-            <a:noFill/>
-          </a:ln>
-        </p:spPr>
-        <p:style>
-          <a:lnRef idx="2">
-            <a:schemeClr val="accent1">
-              <a:shade val="15000"/>
-            </a:schemeClr>
-          </a:lnRef>
-          <a:fillRef idx="1">
-            <a:schemeClr val="accent1"/>
-          </a:fillRef>
-          <a:effectRef idx="0">
-            <a:schemeClr val="accent1"/>
-          </a:effectRef>
-          <a:fontRef idx="minor">
-            <a:schemeClr val="lt1"/>
-          </a:fontRef>
-        </p:style>
-        <p:txBody>
-          <a:bodyPr rtlCol="0" anchor="ctr"/>
-          <a:lstStyle/>
-          <a:p>
-            <a:pPr algn="ctr"/>
-            <a:r>
-              <a:rPr lang="en-US" dirty="0"/>
-              <a:t>Text messages</a:t>
-            </a:r>
-          </a:p>
-        </p:txBody>
-      </p:sp>
-      <p:sp>
-        <p:nvSpPr>
-          <p:cNvPr id="12" name="Oval 11">
-            <a:extLst>
-              <a:ext uri="{FF2B5EF4-FFF2-40B4-BE49-F238E27FC236}">
-                <a16:creationId xmlns:a16="http://schemas.microsoft.com/office/drawing/2014/main" id="{54FA88FD-1C5D-8A62-62AB-A0A127447AF5}"/>
-              </a:ext>
-            </a:extLst>
-          </p:cNvPr>
-          <p:cNvSpPr/>
-          <p:nvPr/>
-        </p:nvSpPr>
-        <p:spPr>
-          <a:xfrm>
-            <a:off x="8349891" y="5328213"/>
-            <a:ext cx="1235140" cy="1259845"/>
-          </a:xfrm>
-          <a:prstGeom prst="ellipse">
-            <a:avLst/>
-          </a:prstGeom>
-          <a:solidFill>
-            <a:srgbClr val="1D193D"/>
-          </a:solidFill>
-          <a:ln>
-            <a:noFill/>
-          </a:ln>
-        </p:spPr>
-        <p:style>
-          <a:lnRef idx="2">
-            <a:schemeClr val="accent1">
-              <a:shade val="15000"/>
-            </a:schemeClr>
-          </a:lnRef>
-          <a:fillRef idx="1">
-            <a:schemeClr val="accent1"/>
-          </a:fillRef>
-          <a:effectRef idx="0">
-            <a:schemeClr val="accent1"/>
-          </a:effectRef>
-          <a:fontRef idx="minor">
-            <a:schemeClr val="lt1"/>
-          </a:fontRef>
-        </p:style>
-        <p:txBody>
-          <a:bodyPr rtlCol="0" anchor="ctr"/>
-          <a:lstStyle/>
-          <a:p>
-            <a:pPr algn="ctr"/>
-            <a:r>
-              <a:rPr lang="en-US" dirty="0"/>
-              <a:t>Images</a:t>
-            </a:r>
-          </a:p>
-        </p:txBody>
-      </p:sp>
-      <p:sp>
-        <p:nvSpPr>
-          <p:cNvPr id="13" name="Oval 12">
-            <a:extLst>
-              <a:ext uri="{FF2B5EF4-FFF2-40B4-BE49-F238E27FC236}">
-                <a16:creationId xmlns:a16="http://schemas.microsoft.com/office/drawing/2014/main" id="{96A71044-C41C-051A-43CC-74B52DCD4970}"/>
-              </a:ext>
-            </a:extLst>
-          </p:cNvPr>
-          <p:cNvSpPr/>
-          <p:nvPr/>
-        </p:nvSpPr>
-        <p:spPr>
+        </p:nvGrpSpPr>
+        <p:grpSpPr>
           <a:xfrm>
             <a:off x="5202690" y="322654"/>
-            <a:ext cx="997484" cy="997484"/>
+            <a:ext cx="997484" cy="3287533"/>
+            <a:chOff x="5202690" y="322654"/>
+            <a:chExt cx="997484" cy="3287533"/>
           </a:xfrm>
-          <a:prstGeom prst="ellipse">
-            <a:avLst/>
-          </a:prstGeom>
-          <a:solidFill>
-            <a:srgbClr val="1D193D"/>
-          </a:solidFill>
-          <a:ln>
-            <a:noFill/>
-          </a:ln>
-        </p:spPr>
-        <p:style>
-          <a:lnRef idx="2">
-            <a:schemeClr val="accent1">
-              <a:shade val="15000"/>
-            </a:schemeClr>
-          </a:lnRef>
-          <a:fillRef idx="1">
-            <a:schemeClr val="accent1"/>
-          </a:fillRef>
-          <a:effectRef idx="0">
-            <a:schemeClr val="accent1"/>
-          </a:effectRef>
-          <a:fontRef idx="minor">
-            <a:schemeClr val="lt1"/>
-          </a:fontRef>
-        </p:style>
-        <p:txBody>
-          <a:bodyPr rtlCol="0" anchor="ctr"/>
-          <a:lstStyle/>
-          <a:p>
-            <a:pPr algn="ctr"/>
-            <a:r>
-              <a:rPr lang="en-US" dirty="0"/>
-              <a:t>Meta</a:t>
-            </a:r>
-          </a:p>
-        </p:txBody>
-      </p:sp>
+        </p:grpSpPr>
+        <p:sp>
+          <p:nvSpPr>
+            <p:cNvPr id="13" name="Oval 12">
+              <a:extLst>
+                <a:ext uri="{FF2B5EF4-FFF2-40B4-BE49-F238E27FC236}">
+                  <a16:creationId xmlns:a16="http://schemas.microsoft.com/office/drawing/2014/main" id="{96A71044-C41C-051A-43CC-74B52DCD4970}"/>
+                </a:ext>
+              </a:extLst>
+            </p:cNvPr>
+            <p:cNvSpPr/>
+            <p:nvPr/>
+          </p:nvSpPr>
+          <p:spPr>
+            <a:xfrm>
+              <a:off x="5202690" y="322654"/>
+              <a:ext cx="997484" cy="997484"/>
+            </a:xfrm>
+            <a:prstGeom prst="ellipse">
+              <a:avLst/>
+            </a:prstGeom>
+            <a:solidFill>
+              <a:srgbClr val="1D193D"/>
+            </a:solidFill>
+            <a:ln>
+              <a:noFill/>
+            </a:ln>
+          </p:spPr>
+          <p:style>
+            <a:lnRef idx="2">
+              <a:schemeClr val="accent1">
+                <a:shade val="15000"/>
+              </a:schemeClr>
+            </a:lnRef>
+            <a:fillRef idx="1">
+              <a:schemeClr val="accent1"/>
+            </a:fillRef>
+            <a:effectRef idx="0">
+              <a:schemeClr val="accent1"/>
+            </a:effectRef>
+            <a:fontRef idx="minor">
+              <a:schemeClr val="lt1"/>
+            </a:fontRef>
+          </p:style>
+          <p:txBody>
+            <a:bodyPr rtlCol="0" anchor="ctr"/>
+            <a:lstStyle/>
+            <a:p>
+              <a:pPr algn="ctr"/>
+              <a:r>
+                <a:rPr lang="en-US" dirty="0"/>
+                <a:t>Meta</a:t>
+              </a:r>
+            </a:p>
+          </p:txBody>
+        </p:sp>
+        <p:cxnSp>
+          <p:nvCxnSpPr>
+            <p:cNvPr id="17" name="Straight Connector 16">
+              <a:extLst>
+                <a:ext uri="{FF2B5EF4-FFF2-40B4-BE49-F238E27FC236}">
+                  <a16:creationId xmlns:a16="http://schemas.microsoft.com/office/drawing/2014/main" id="{B465D4A7-3C7D-4074-1CF8-A060B32083C8}"/>
+                </a:ext>
+              </a:extLst>
+            </p:cNvPr>
+            <p:cNvCxnSpPr>
+              <a:cxnSpLocks/>
+            </p:cNvCxnSpPr>
+            <p:nvPr/>
+          </p:nvCxnSpPr>
+          <p:spPr>
+            <a:xfrm flipH="1" flipV="1">
+              <a:off x="5461000" y="2192867"/>
+              <a:ext cx="316653" cy="1417320"/>
+            </a:xfrm>
+            <a:prstGeom prst="line">
+              <a:avLst/>
+            </a:prstGeom>
+            <a:ln>
+              <a:solidFill>
+                <a:srgbClr val="1D193D"/>
+              </a:solidFill>
+            </a:ln>
+          </p:spPr>
+          <p:style>
+            <a:lnRef idx="1">
+              <a:schemeClr val="accent1"/>
+            </a:lnRef>
+            <a:fillRef idx="0">
+              <a:schemeClr val="accent1"/>
+            </a:fillRef>
+            <a:effectRef idx="0">
+              <a:schemeClr val="accent1"/>
+            </a:effectRef>
+            <a:fontRef idx="minor">
+              <a:schemeClr val="tx1"/>
+            </a:fontRef>
+          </p:style>
+        </p:cxnSp>
+        <p:cxnSp>
+          <p:nvCxnSpPr>
+            <p:cNvPr id="54" name="Straight Connector 53">
+              <a:extLst>
+                <a:ext uri="{FF2B5EF4-FFF2-40B4-BE49-F238E27FC236}">
+                  <a16:creationId xmlns:a16="http://schemas.microsoft.com/office/drawing/2014/main" id="{C1FB9CAA-583E-15B4-FF2E-833DBC211B6F}"/>
+                </a:ext>
+              </a:extLst>
+            </p:cNvPr>
+            <p:cNvCxnSpPr>
+              <a:cxnSpLocks/>
+              <a:endCxn id="13" idx="4"/>
+            </p:cNvCxnSpPr>
+            <p:nvPr/>
+          </p:nvCxnSpPr>
+          <p:spPr>
+            <a:xfrm flipV="1">
+              <a:off x="5461000" y="1320138"/>
+              <a:ext cx="240432" cy="872729"/>
+            </a:xfrm>
+            <a:prstGeom prst="line">
+              <a:avLst/>
+            </a:prstGeom>
+            <a:ln>
+              <a:solidFill>
+                <a:srgbClr val="1D193D"/>
+              </a:solidFill>
+            </a:ln>
+          </p:spPr>
+          <p:style>
+            <a:lnRef idx="1">
+              <a:schemeClr val="accent1"/>
+            </a:lnRef>
+            <a:fillRef idx="0">
+              <a:schemeClr val="accent1"/>
+            </a:fillRef>
+            <a:effectRef idx="0">
+              <a:schemeClr val="accent1"/>
+            </a:effectRef>
+            <a:fontRef idx="minor">
+              <a:schemeClr val="tx1"/>
+            </a:fontRef>
+          </p:style>
+        </p:cxnSp>
+      </p:grpSp>
     </p:spTree>
     <p:extLst>
       <p:ext uri="{BB962C8B-B14F-4D97-AF65-F5344CB8AC3E}">
@@ -3969,7 +4618,7 @@
                             </p:stCondLst>
                             <p:childTnLst>
                               <p:par>
-                                <p:cTn id="5" presetID="10" presetClass="entr" presetSubtype="0" fill="hold" grpId="0" nodeType="clickEffect">
+                                <p:cTn id="5" presetID="10" presetClass="entr" presetSubtype="0" fill="hold" nodeType="clickEffect">
                                   <p:stCondLst>
                                     <p:cond delay="0"/>
                                   </p:stCondLst>
@@ -3982,7 +4631,7 @@
                                           </p:stCondLst>
                                         </p:cTn>
                                         <p:tgtEl>
-                                          <p:spTgt spid="8"/>
+                                          <p:spTgt spid="63"/>
                                         </p:tgtEl>
                                         <p:attrNameLst>
                                           <p:attrName>style.visibility</p:attrName>
@@ -3996,7 +4645,7 @@
                                       <p:cBhvr>
                                         <p:cTn id="7" dur="500"/>
                                         <p:tgtEl>
-                                          <p:spTgt spid="8"/>
+                                          <p:spTgt spid="63"/>
                                         </p:tgtEl>
                                       </p:cBhvr>
                                     </p:animEffect>
@@ -4013,7 +4662,7 @@
                             </p:stCondLst>
                             <p:childTnLst>
                               <p:par>
-                                <p:cTn id="9" presetID="10" presetClass="entr" presetSubtype="0" fill="hold" grpId="0" nodeType="afterEffect">
+                                <p:cTn id="9" presetID="10" presetClass="entr" presetSubtype="0" fill="hold" nodeType="afterEffect">
                                   <p:stCondLst>
                                     <p:cond delay="0"/>
                                   </p:stCondLst>
@@ -4026,7 +4675,7 @@
                                           </p:stCondLst>
                                         </p:cTn>
                                         <p:tgtEl>
-                                          <p:spTgt spid="11"/>
+                                          <p:spTgt spid="64"/>
                                         </p:tgtEl>
                                         <p:attrNameLst>
                                           <p:attrName>style.visibility</p:attrName>
@@ -4040,7 +4689,7 @@
                                       <p:cBhvr>
                                         <p:cTn id="11" dur="500"/>
                                         <p:tgtEl>
-                                          <p:spTgt spid="11"/>
+                                          <p:spTgt spid="64"/>
                                         </p:tgtEl>
                                       </p:cBhvr>
                                     </p:animEffect>
@@ -4057,7 +4706,7 @@
                             </p:stCondLst>
                             <p:childTnLst>
                               <p:par>
-                                <p:cTn id="13" presetID="10" presetClass="entr" presetSubtype="0" fill="hold" grpId="0" nodeType="afterEffect">
+                                <p:cTn id="13" presetID="10" presetClass="entr" presetSubtype="0" fill="hold" nodeType="afterEffect">
                                   <p:stCondLst>
                                     <p:cond delay="0"/>
                                   </p:stCondLst>
@@ -4070,7 +4719,7 @@
                                           </p:stCondLst>
                                         </p:cTn>
                                         <p:tgtEl>
-                                          <p:spTgt spid="6"/>
+                                          <p:spTgt spid="70"/>
                                         </p:tgtEl>
                                         <p:attrNameLst>
                                           <p:attrName>style.visibility</p:attrName>
@@ -4084,7 +4733,7 @@
                                       <p:cBhvr>
                                         <p:cTn id="15" dur="500"/>
                                         <p:tgtEl>
-                                          <p:spTgt spid="6"/>
+                                          <p:spTgt spid="70"/>
                                         </p:tgtEl>
                                       </p:cBhvr>
                                     </p:animEffect>
@@ -4101,7 +4750,7 @@
                             </p:stCondLst>
                             <p:childTnLst>
                               <p:par>
-                                <p:cTn id="17" presetID="10" presetClass="entr" presetSubtype="0" fill="hold" grpId="0" nodeType="afterEffect">
+                                <p:cTn id="17" presetID="10" presetClass="entr" presetSubtype="0" fill="hold" nodeType="afterEffect">
                                   <p:stCondLst>
                                     <p:cond delay="0"/>
                                   </p:stCondLst>
@@ -4114,7 +4763,7 @@
                                           </p:stCondLst>
                                         </p:cTn>
                                         <p:tgtEl>
-                                          <p:spTgt spid="7"/>
+                                          <p:spTgt spid="66"/>
                                         </p:tgtEl>
                                         <p:attrNameLst>
                                           <p:attrName>style.visibility</p:attrName>
@@ -4128,7 +4777,7 @@
                                       <p:cBhvr>
                                         <p:cTn id="19" dur="500"/>
                                         <p:tgtEl>
-                                          <p:spTgt spid="7"/>
+                                          <p:spTgt spid="66"/>
                                         </p:tgtEl>
                                       </p:cBhvr>
                                     </p:animEffect>
@@ -4145,7 +4794,7 @@
                             </p:stCondLst>
                             <p:childTnLst>
                               <p:par>
-                                <p:cTn id="21" presetID="10" presetClass="entr" presetSubtype="0" fill="hold" grpId="0" nodeType="afterEffect">
+                                <p:cTn id="21" presetID="10" presetClass="entr" presetSubtype="0" fill="hold" nodeType="afterEffect">
                                   <p:stCondLst>
                                     <p:cond delay="0"/>
                                   </p:stCondLst>
@@ -4158,7 +4807,7 @@
                                           </p:stCondLst>
                                         </p:cTn>
                                         <p:tgtEl>
-                                          <p:spTgt spid="9"/>
+                                          <p:spTgt spid="62"/>
                                         </p:tgtEl>
                                         <p:attrNameLst>
                                           <p:attrName>style.visibility</p:attrName>
@@ -4172,7 +4821,7 @@
                                       <p:cBhvr>
                                         <p:cTn id="23" dur="500"/>
                                         <p:tgtEl>
-                                          <p:spTgt spid="9"/>
+                                          <p:spTgt spid="62"/>
                                         </p:tgtEl>
                                       </p:cBhvr>
                                     </p:animEffect>
@@ -4189,7 +4838,7 @@
                             </p:stCondLst>
                             <p:childTnLst>
                               <p:par>
-                                <p:cTn id="25" presetID="10" presetClass="entr" presetSubtype="0" fill="hold" grpId="0" nodeType="afterEffect">
+                                <p:cTn id="25" presetID="10" presetClass="entr" presetSubtype="0" fill="hold" nodeType="afterEffect">
                                   <p:stCondLst>
                                     <p:cond delay="0"/>
                                   </p:stCondLst>
@@ -4202,7 +4851,7 @@
                                           </p:stCondLst>
                                         </p:cTn>
                                         <p:tgtEl>
-                                          <p:spTgt spid="10"/>
+                                          <p:spTgt spid="61"/>
                                         </p:tgtEl>
                                         <p:attrNameLst>
                                           <p:attrName>style.visibility</p:attrName>
@@ -4216,7 +4865,7 @@
                                       <p:cBhvr>
                                         <p:cTn id="27" dur="500"/>
                                         <p:tgtEl>
-                                          <p:spTgt spid="10"/>
+                                          <p:spTgt spid="61"/>
                                         </p:tgtEl>
                                       </p:cBhvr>
                                     </p:animEffect>
@@ -4233,7 +4882,7 @@
                             </p:stCondLst>
                             <p:childTnLst>
                               <p:par>
-                                <p:cTn id="29" presetID="10" presetClass="entr" presetSubtype="0" fill="hold" grpId="0" nodeType="afterEffect">
+                                <p:cTn id="29" presetID="10" presetClass="entr" presetSubtype="0" fill="hold" nodeType="afterEffect">
                                   <p:stCondLst>
                                     <p:cond delay="0"/>
                                   </p:stCondLst>
@@ -4246,7 +4895,7 @@
                                           </p:stCondLst>
                                         </p:cTn>
                                         <p:tgtEl>
-                                          <p:spTgt spid="12"/>
+                                          <p:spTgt spid="59"/>
                                         </p:tgtEl>
                                         <p:attrNameLst>
                                           <p:attrName>style.visibility</p:attrName>
@@ -4260,7 +4909,7 @@
                                       <p:cBhvr>
                                         <p:cTn id="31" dur="500"/>
                                         <p:tgtEl>
-                                          <p:spTgt spid="12"/>
+                                          <p:spTgt spid="59"/>
                                         </p:tgtEl>
                                       </p:cBhvr>
                                     </p:animEffect>
@@ -4277,7 +4926,7 @@
                             </p:stCondLst>
                             <p:childTnLst>
                               <p:par>
-                                <p:cTn id="33" presetID="10" presetClass="entr" presetSubtype="0" fill="hold" grpId="0" nodeType="afterEffect">
+                                <p:cTn id="33" presetID="10" presetClass="entr" presetSubtype="0" fill="hold" nodeType="afterEffect">
                                   <p:stCondLst>
                                     <p:cond delay="0"/>
                                   </p:stCondLst>
@@ -4290,7 +4939,7 @@
                                           </p:stCondLst>
                                         </p:cTn>
                                         <p:tgtEl>
-                                          <p:spTgt spid="13"/>
+                                          <p:spTgt spid="60"/>
                                         </p:tgtEl>
                                         <p:attrNameLst>
                                           <p:attrName>style.visibility</p:attrName>
@@ -4304,7 +4953,7 @@
                                       <p:cBhvr>
                                         <p:cTn id="35" dur="500"/>
                                         <p:tgtEl>
-                                          <p:spTgt spid="13"/>
+                                          <p:spTgt spid="60"/>
                                         </p:tgtEl>
                                       </p:cBhvr>
                                     </p:animEffect>
@@ -4338,16 +4987,6 @@
         </p:cTn>
       </p:par>
     </p:tnLst>
-    <p:bldLst>
-      <p:bldP spid="6" grpId="0" animBg="1"/>
-      <p:bldP spid="7" grpId="0" animBg="1"/>
-      <p:bldP spid="8" grpId="0" animBg="1"/>
-      <p:bldP spid="9" grpId="0" animBg="1"/>
-      <p:bldP spid="10" grpId="0" animBg="1"/>
-      <p:bldP spid="11" grpId="0" animBg="1"/>
-      <p:bldP spid="12" grpId="0" animBg="1"/>
-      <p:bldP spid="13" grpId="0" animBg="1"/>
-    </p:bldLst>
   </p:timing>
 </p:sld>
 </file>

</xml_diff>

<commit_message>
added goals of DA slide
</commit_message>
<xml_diff>
--- a/WhatIsDataAnalysis.pptx
+++ b/WhatIsDataAnalysis.pptx
@@ -8,6 +8,7 @@
     <p:sldId id="256" r:id="rId2"/>
     <p:sldId id="257" r:id="rId3"/>
     <p:sldId id="258" r:id="rId4"/>
+    <p:sldId id="259" r:id="rId5"/>
   </p:sldIdLst>
   <p:sldSz cx="12192000" cy="6858000"/>
   <p:notesSz cx="6858000" cy="9144000"/>
@@ -6298,6 +6299,133 @@
 </p:sld>
 </file>
 
+<file path=ppt/slides/slide4.xml><?xml version="1.0" encoding="utf-8"?>
+<p:sld xmlns:a="http://schemas.openxmlformats.org/drawingml/2006/main" xmlns:r="http://schemas.openxmlformats.org/officeDocument/2006/relationships" xmlns:p="http://schemas.openxmlformats.org/presentationml/2006/main">
+  <p:cSld>
+    <p:spTree>
+      <p:nvGrpSpPr>
+        <p:cNvPr id="1" name=""/>
+        <p:cNvGrpSpPr/>
+        <p:nvPr/>
+      </p:nvGrpSpPr>
+      <p:grpSpPr>
+        <a:xfrm>
+          <a:off x="0" y="0"/>
+          <a:ext cx="0" cy="0"/>
+          <a:chOff x="0" y="0"/>
+          <a:chExt cx="0" cy="0"/>
+        </a:xfrm>
+      </p:grpSpPr>
+      <p:sp>
+        <p:nvSpPr>
+          <p:cNvPr id="2" name="Title 1">
+            <a:extLst>
+              <a:ext uri="{FF2B5EF4-FFF2-40B4-BE49-F238E27FC236}">
+                <a16:creationId xmlns:a16="http://schemas.microsoft.com/office/drawing/2014/main" id="{0BDAEAA3-C269-478E-2B36-618D515A280B}"/>
+              </a:ext>
+            </a:extLst>
+          </p:cNvPr>
+          <p:cNvSpPr>
+            <a:spLocks noGrp="1"/>
+          </p:cNvSpPr>
+          <p:nvPr>
+            <p:ph type="title"/>
+          </p:nvPr>
+        </p:nvSpPr>
+        <p:spPr/>
+        <p:txBody>
+          <a:bodyPr/>
+          <a:lstStyle/>
+          <a:p>
+            <a:r>
+              <a:rPr lang="en-US" dirty="0"/>
+              <a:t>Goal(s) of Data Analysis</a:t>
+            </a:r>
+          </a:p>
+        </p:txBody>
+      </p:sp>
+      <p:sp>
+        <p:nvSpPr>
+          <p:cNvPr id="3" name="Content Placeholder 2">
+            <a:extLst>
+              <a:ext uri="{FF2B5EF4-FFF2-40B4-BE49-F238E27FC236}">
+                <a16:creationId xmlns:a16="http://schemas.microsoft.com/office/drawing/2014/main" id="{EF3ABB2D-4694-5F59-A444-074259769EC0}"/>
+              </a:ext>
+            </a:extLst>
+          </p:cNvPr>
+          <p:cNvSpPr>
+            <a:spLocks noGrp="1"/>
+          </p:cNvSpPr>
+          <p:nvPr>
+            <p:ph idx="1"/>
+          </p:nvPr>
+        </p:nvSpPr>
+        <p:spPr/>
+        <p:txBody>
+          <a:bodyPr>
+            <a:normAutofit/>
+          </a:bodyPr>
+          <a:lstStyle/>
+          <a:p>
+            <a:pPr marL="0" indent="0">
+              <a:buNone/>
+            </a:pPr>
+            <a:r>
+              <a:rPr lang="en-US" sz="3600" dirty="0"/>
+              <a:t>Understand the data, in order to:</a:t>
+            </a:r>
+          </a:p>
+          <a:p>
+            <a:pPr>
+              <a:buFont typeface="Arial" panose="020B0604020202020204" pitchFamily="34" charset="0"/>
+              <a:buChar char="•"/>
+            </a:pPr>
+            <a:r>
+              <a:rPr lang="en-GB" sz="3600" dirty="0"/>
+              <a:t>Better decisions (should we choose A or B)</a:t>
+            </a:r>
+          </a:p>
+          <a:p>
+            <a:pPr>
+              <a:buFont typeface="Arial" panose="020B0604020202020204" pitchFamily="34" charset="0"/>
+              <a:buChar char="•"/>
+            </a:pPr>
+            <a:r>
+              <a:rPr lang="en-GB" sz="3600" dirty="0"/>
+              <a:t>Predictive analysis (what will happen next?)</a:t>
+            </a:r>
+          </a:p>
+          <a:p>
+            <a:pPr>
+              <a:buFont typeface="Arial" panose="020B0604020202020204" pitchFamily="34" charset="0"/>
+              <a:buChar char="•"/>
+            </a:pPr>
+            <a:r>
+              <a:rPr lang="en-GB" sz="3600" dirty="0"/>
+              <a:t>Pattern discoveries (find pattern, or maybe hidden information in the data)</a:t>
+            </a:r>
+          </a:p>
+          <a:p>
+            <a:pPr marL="0" indent="0">
+              <a:buNone/>
+            </a:pPr>
+            <a:endParaRPr lang="en-US" sz="3600" dirty="0"/>
+          </a:p>
+        </p:txBody>
+      </p:sp>
+    </p:spTree>
+    <p:extLst>
+      <p:ext uri="{BB962C8B-B14F-4D97-AF65-F5344CB8AC3E}">
+        <p14:creationId xmlns:p14="http://schemas.microsoft.com/office/powerpoint/2010/main" val="1671312589"/>
+      </p:ext>
+    </p:extLst>
+  </p:cSld>
+  <p:clrMapOvr>
+    <a:masterClrMapping/>
+  </p:clrMapOvr>
+</p:sld>
+</file>
+
 <file path=ppt/theme/theme1.xml><?xml version="1.0" encoding="utf-8"?>
 <a:theme xmlns:a="http://schemas.openxmlformats.org/drawingml/2006/main" name="Office Theme">
   <a:themeElements>

</xml_diff>

<commit_message>
added steps of DA slide
</commit_message>
<xml_diff>
--- a/WhatIsDataAnalysis.pptx
+++ b/WhatIsDataAnalysis.pptx
@@ -9,6 +9,7 @@
     <p:sldId id="257" r:id="rId3"/>
     <p:sldId id="258" r:id="rId4"/>
     <p:sldId id="259" r:id="rId5"/>
+    <p:sldId id="260" r:id="rId6"/>
   </p:sldIdLst>
   <p:sldSz cx="12192000" cy="6858000"/>
   <p:notesSz cx="6858000" cy="9144000"/>
@@ -6426,6 +6427,139 @@
 </p:sld>
 </file>
 
+<file path=ppt/slides/slide5.xml><?xml version="1.0" encoding="utf-8"?>
+<p:sld xmlns:a="http://schemas.openxmlformats.org/drawingml/2006/main" xmlns:r="http://schemas.openxmlformats.org/officeDocument/2006/relationships" xmlns:p="http://schemas.openxmlformats.org/presentationml/2006/main">
+  <p:cSld>
+    <p:spTree>
+      <p:nvGrpSpPr>
+        <p:cNvPr id="1" name=""/>
+        <p:cNvGrpSpPr/>
+        <p:nvPr/>
+      </p:nvGrpSpPr>
+      <p:grpSpPr>
+        <a:xfrm>
+          <a:off x="0" y="0"/>
+          <a:ext cx="0" cy="0"/>
+          <a:chOff x="0" y="0"/>
+          <a:chExt cx="0" cy="0"/>
+        </a:xfrm>
+      </p:grpSpPr>
+      <p:sp>
+        <p:nvSpPr>
+          <p:cNvPr id="2" name="Title 1">
+            <a:extLst>
+              <a:ext uri="{FF2B5EF4-FFF2-40B4-BE49-F238E27FC236}">
+                <a16:creationId xmlns:a16="http://schemas.microsoft.com/office/drawing/2014/main" id="{0BDAEAA3-C269-478E-2B36-618D515A280B}"/>
+              </a:ext>
+            </a:extLst>
+          </p:cNvPr>
+          <p:cNvSpPr>
+            <a:spLocks noGrp="1"/>
+          </p:cNvSpPr>
+          <p:nvPr>
+            <p:ph type="title"/>
+          </p:nvPr>
+        </p:nvSpPr>
+        <p:spPr/>
+        <p:txBody>
+          <a:bodyPr/>
+          <a:lstStyle/>
+          <a:p>
+            <a:r>
+              <a:rPr lang="en-US" dirty="0"/>
+              <a:t>Steps of Data Analysis</a:t>
+            </a:r>
+          </a:p>
+        </p:txBody>
+      </p:sp>
+      <p:sp>
+        <p:nvSpPr>
+          <p:cNvPr id="3" name="Content Placeholder 2">
+            <a:extLst>
+              <a:ext uri="{FF2B5EF4-FFF2-40B4-BE49-F238E27FC236}">
+                <a16:creationId xmlns:a16="http://schemas.microsoft.com/office/drawing/2014/main" id="{EF3ABB2D-4694-5F59-A444-074259769EC0}"/>
+              </a:ext>
+            </a:extLst>
+          </p:cNvPr>
+          <p:cNvSpPr>
+            <a:spLocks noGrp="1"/>
+          </p:cNvSpPr>
+          <p:nvPr>
+            <p:ph idx="1"/>
+          </p:nvPr>
+        </p:nvSpPr>
+        <p:spPr/>
+        <p:txBody>
+          <a:bodyPr>
+            <a:normAutofit/>
+          </a:bodyPr>
+          <a:lstStyle/>
+          <a:p>
+            <a:pPr marL="0" indent="0">
+              <a:buNone/>
+            </a:pPr>
+            <a:r>
+              <a:rPr lang="en-US" sz="3600" dirty="0"/>
+              <a:t>In order to understand the data, we in order:</a:t>
+            </a:r>
+          </a:p>
+          <a:p>
+            <a:r>
+              <a:rPr lang="en-US" sz="3600" dirty="0"/>
+              <a:t>Gather data (SQL, web </a:t>
+            </a:r>
+            <a:r>
+              <a:rPr lang="en-US" sz="3600" dirty="0" err="1"/>
+              <a:t>scrpping</a:t>
+            </a:r>
+            <a:r>
+              <a:rPr lang="en-US" sz="3600" dirty="0"/>
+              <a:t>, </a:t>
+            </a:r>
+            <a:r>
+              <a:rPr lang="en-US" sz="3600" dirty="0" err="1"/>
+              <a:t>etc</a:t>
+            </a:r>
+            <a:r>
+              <a:rPr lang="en-US" sz="3600" dirty="0"/>
+              <a:t>…)</a:t>
+            </a:r>
+          </a:p>
+          <a:p>
+            <a:r>
+              <a:rPr lang="en-US" sz="3600" dirty="0"/>
+              <a:t>Analyze data (using statistics, machine learning models, </a:t>
+            </a:r>
+            <a:r>
+              <a:rPr lang="en-US" sz="3600" dirty="0" err="1"/>
+              <a:t>etc</a:t>
+            </a:r>
+            <a:r>
+              <a:rPr lang="en-US" sz="3600" dirty="0"/>
+              <a:t>…)</a:t>
+            </a:r>
+          </a:p>
+          <a:p>
+            <a:r>
+              <a:rPr lang="en-US" sz="3600" dirty="0"/>
+              <a:t>Take decisions accordingly (business analytics /  common sense)</a:t>
+            </a:r>
+          </a:p>
+        </p:txBody>
+      </p:sp>
+    </p:spTree>
+    <p:extLst>
+      <p:ext uri="{BB962C8B-B14F-4D97-AF65-F5344CB8AC3E}">
+        <p14:creationId xmlns:p14="http://schemas.microsoft.com/office/powerpoint/2010/main" val="3234180614"/>
+      </p:ext>
+    </p:extLst>
+  </p:cSld>
+  <p:clrMapOvr>
+    <a:masterClrMapping/>
+  </p:clrMapOvr>
+</p:sld>
+</file>
+
 <file path=ppt/theme/theme1.xml><?xml version="1.0" encoding="utf-8"?>
 <a:theme xmlns:a="http://schemas.openxmlformats.org/drawingml/2006/main" name="Office Theme">
   <a:themeElements>

</xml_diff>

<commit_message>
use of DA slide
</commit_message>
<xml_diff>
--- a/WhatIsDataAnalysis.pptx
+++ b/WhatIsDataAnalysis.pptx
@@ -10,6 +10,7 @@
     <p:sldId id="258" r:id="rId4"/>
     <p:sldId id="259" r:id="rId5"/>
     <p:sldId id="260" r:id="rId6"/>
+    <p:sldId id="261" r:id="rId7"/>
   </p:sldIdLst>
   <p:sldSz cx="12192000" cy="6858000"/>
   <p:notesSz cx="6858000" cy="9144000"/>
@@ -7114,6 +7115,175 @@
 </p:sld>
 </file>
 
+<file path=ppt/slides/slide6.xml><?xml version="1.0" encoding="utf-8"?>
+<p:sld xmlns:a="http://schemas.openxmlformats.org/drawingml/2006/main" xmlns:r="http://schemas.openxmlformats.org/officeDocument/2006/relationships" xmlns:p="http://schemas.openxmlformats.org/presentationml/2006/main">
+  <p:cSld>
+    <p:spTree>
+      <p:nvGrpSpPr>
+        <p:cNvPr id="1" name=""/>
+        <p:cNvGrpSpPr/>
+        <p:nvPr/>
+      </p:nvGrpSpPr>
+      <p:grpSpPr>
+        <a:xfrm>
+          <a:off x="0" y="0"/>
+          <a:ext cx="0" cy="0"/>
+          <a:chOff x="0" y="0"/>
+          <a:chExt cx="0" cy="0"/>
+        </a:xfrm>
+      </p:grpSpPr>
+      <p:sp>
+        <p:nvSpPr>
+          <p:cNvPr id="2" name="Title 1">
+            <a:extLst>
+              <a:ext uri="{FF2B5EF4-FFF2-40B4-BE49-F238E27FC236}">
+                <a16:creationId xmlns:a16="http://schemas.microsoft.com/office/drawing/2014/main" id="{6F2F56F3-34DB-F1B3-BDBC-B697194D7862}"/>
+              </a:ext>
+            </a:extLst>
+          </p:cNvPr>
+          <p:cNvSpPr>
+            <a:spLocks noGrp="1"/>
+          </p:cNvSpPr>
+          <p:nvPr>
+            <p:ph type="title"/>
+          </p:nvPr>
+        </p:nvSpPr>
+        <p:spPr/>
+        <p:txBody>
+          <a:bodyPr/>
+          <a:lstStyle/>
+          <a:p>
+            <a:r>
+              <a:rPr lang="en-GB" b="1" dirty="0"/>
+              <a:t>Where is Data Science Needed?</a:t>
+            </a:r>
+            <a:endParaRPr lang="en-US" dirty="0"/>
+          </a:p>
+        </p:txBody>
+      </p:sp>
+      <p:sp>
+        <p:nvSpPr>
+          <p:cNvPr id="3" name="Content Placeholder 2">
+            <a:extLst>
+              <a:ext uri="{FF2B5EF4-FFF2-40B4-BE49-F238E27FC236}">
+                <a16:creationId xmlns:a16="http://schemas.microsoft.com/office/drawing/2014/main" id="{9F3F180B-A3B5-DA85-DA44-A7BB0AC12CF0}"/>
+              </a:ext>
+            </a:extLst>
+          </p:cNvPr>
+          <p:cNvSpPr>
+            <a:spLocks noGrp="1"/>
+          </p:cNvSpPr>
+          <p:nvPr>
+            <p:ph idx="1"/>
+          </p:nvPr>
+        </p:nvSpPr>
+        <p:spPr/>
+        <p:txBody>
+          <a:bodyPr/>
+          <a:lstStyle/>
+          <a:p>
+            <a:pPr>
+              <a:buFont typeface="Arial" panose="020B0604020202020204" pitchFamily="34" charset="0"/>
+              <a:buChar char="•"/>
+            </a:pPr>
+            <a:r>
+              <a:rPr lang="en-GB" dirty="0"/>
+              <a:t>To foresee delays for flight/ship/train etc…</a:t>
+            </a:r>
+          </a:p>
+          <a:p>
+            <a:pPr>
+              <a:buFont typeface="Arial" panose="020B0604020202020204" pitchFamily="34" charset="0"/>
+              <a:buChar char="•"/>
+            </a:pPr>
+            <a:r>
+              <a:rPr lang="en-GB" dirty="0"/>
+              <a:t>To predict when a mechanical equipment is about to break</a:t>
+            </a:r>
+          </a:p>
+          <a:p>
+            <a:pPr>
+              <a:buFont typeface="Arial" panose="020B0604020202020204" pitchFamily="34" charset="0"/>
+              <a:buChar char="•"/>
+            </a:pPr>
+            <a:r>
+              <a:rPr lang="en-GB" dirty="0"/>
+              <a:t>To create personalized promotional offers</a:t>
+            </a:r>
+          </a:p>
+          <a:p>
+            <a:pPr>
+              <a:buFont typeface="Arial" panose="020B0604020202020204" pitchFamily="34" charset="0"/>
+              <a:buChar char="•"/>
+            </a:pPr>
+            <a:r>
+              <a:rPr lang="en-GB" dirty="0"/>
+              <a:t>To find the best suited time to deliver goods / send emails</a:t>
+            </a:r>
+          </a:p>
+          <a:p>
+            <a:pPr>
+              <a:buFont typeface="Arial" panose="020B0604020202020204" pitchFamily="34" charset="0"/>
+              <a:buChar char="•"/>
+            </a:pPr>
+            <a:r>
+              <a:rPr lang="en-GB" dirty="0"/>
+              <a:t>To forecast the next years revenue for a company</a:t>
+            </a:r>
+          </a:p>
+          <a:p>
+            <a:pPr>
+              <a:buFont typeface="Arial" panose="020B0604020202020204" pitchFamily="34" charset="0"/>
+              <a:buChar char="•"/>
+            </a:pPr>
+            <a:r>
+              <a:rPr lang="en-GB" dirty="0"/>
+              <a:t>To </a:t>
+            </a:r>
+            <a:r>
+              <a:rPr lang="en-GB" dirty="0" err="1"/>
+              <a:t>analyze</a:t>
+            </a:r>
+            <a:r>
+              <a:rPr lang="en-GB" dirty="0"/>
+              <a:t> health benefit of treatments</a:t>
+            </a:r>
+          </a:p>
+          <a:p>
+            <a:pPr>
+              <a:buFont typeface="Arial" panose="020B0604020202020204" pitchFamily="34" charset="0"/>
+              <a:buChar char="•"/>
+            </a:pPr>
+            <a:r>
+              <a:rPr lang="en-GB" dirty="0"/>
+              <a:t>To predict who will win elections</a:t>
+            </a:r>
+          </a:p>
+          <a:p>
+            <a:pPr>
+              <a:buFont typeface="Arial" panose="020B0604020202020204" pitchFamily="34" charset="0"/>
+              <a:buChar char="•"/>
+            </a:pPr>
+            <a:r>
+              <a:rPr lang="en-GB" dirty="0"/>
+              <a:t>To change/update equipment just before they fail</a:t>
+            </a:r>
+          </a:p>
+        </p:txBody>
+      </p:sp>
+    </p:spTree>
+    <p:extLst>
+      <p:ext uri="{BB962C8B-B14F-4D97-AF65-F5344CB8AC3E}">
+        <p14:creationId xmlns:p14="http://schemas.microsoft.com/office/powerpoint/2010/main" val="282331553"/>
+      </p:ext>
+    </p:extLst>
+  </p:cSld>
+  <p:clrMapOvr>
+    <a:masterClrMapping/>
+  </p:clrMapOvr>
+</p:sld>
+</file>
+
 <file path=ppt/theme/theme1.xml><?xml version="1.0" encoding="utf-8"?>
 <a:theme xmlns:a="http://schemas.openxmlformats.org/drawingml/2006/main" name="Office Theme">
   <a:themeElements>

</xml_diff>

<commit_message>
added industries + logos
</commit_message>
<xml_diff>
--- a/WhatIsDataAnalysis.pptx
+++ b/WhatIsDataAnalysis.pptx
@@ -7271,6 +7271,356 @@
           </a:p>
         </p:txBody>
       </p:sp>
+      <p:grpSp>
+        <p:nvGrpSpPr>
+          <p:cNvPr id="13" name="Group 12">
+            <a:extLst>
+              <a:ext uri="{FF2B5EF4-FFF2-40B4-BE49-F238E27FC236}">
+                <a16:creationId xmlns:a16="http://schemas.microsoft.com/office/drawing/2014/main" id="{C534D335-1936-B105-4300-3357F341B0B4}"/>
+              </a:ext>
+            </a:extLst>
+          </p:cNvPr>
+          <p:cNvGrpSpPr/>
+          <p:nvPr/>
+        </p:nvGrpSpPr>
+        <p:grpSpPr>
+          <a:xfrm>
+            <a:off x="10436931" y="2031512"/>
+            <a:ext cx="1324786" cy="1501349"/>
+            <a:chOff x="10407946" y="1759397"/>
+            <a:chExt cx="1324786" cy="1501349"/>
+          </a:xfrm>
+        </p:grpSpPr>
+        <p:pic>
+          <p:nvPicPr>
+            <p:cNvPr id="7" name="Picture 6">
+              <a:extLst>
+                <a:ext uri="{FF2B5EF4-FFF2-40B4-BE49-F238E27FC236}">
+                  <a16:creationId xmlns:a16="http://schemas.microsoft.com/office/drawing/2014/main" id="{85DF87B9-1121-C80E-C053-E051D2AB3165}"/>
+                </a:ext>
+              </a:extLst>
+            </p:cNvPr>
+            <p:cNvPicPr>
+              <a:picLocks noChangeAspect="1"/>
+            </p:cNvPicPr>
+            <p:nvPr/>
+          </p:nvPicPr>
+          <p:blipFill>
+            <a:blip r:embed="rId2"/>
+            <a:stretch>
+              <a:fillRect/>
+            </a:stretch>
+          </p:blipFill>
+          <p:spPr>
+            <a:xfrm>
+              <a:off x="10442739" y="1759397"/>
+              <a:ext cx="1255200" cy="1255200"/>
+            </a:xfrm>
+            <a:prstGeom prst="rect">
+              <a:avLst/>
+            </a:prstGeom>
+          </p:spPr>
+        </p:pic>
+        <p:sp>
+          <p:nvSpPr>
+            <p:cNvPr id="10" name="TextBox 9">
+              <a:extLst>
+                <a:ext uri="{FF2B5EF4-FFF2-40B4-BE49-F238E27FC236}">
+                  <a16:creationId xmlns:a16="http://schemas.microsoft.com/office/drawing/2014/main" id="{FFF816F8-A8C4-35F3-1887-AAB6268ABEB2}"/>
+                </a:ext>
+              </a:extLst>
+            </p:cNvPr>
+            <p:cNvSpPr txBox="1"/>
+            <p:nvPr/>
+          </p:nvSpPr>
+          <p:spPr>
+            <a:xfrm>
+              <a:off x="10407946" y="2891414"/>
+              <a:ext cx="1324786" cy="369332"/>
+            </a:xfrm>
+            <a:prstGeom prst="rect">
+              <a:avLst/>
+            </a:prstGeom>
+            <a:noFill/>
+          </p:spPr>
+          <p:txBody>
+            <a:bodyPr wrap="none" rtlCol="0">
+              <a:spAutoFit/>
+            </a:bodyPr>
+            <a:lstStyle/>
+            <a:p>
+              <a:r>
+                <a:rPr lang="en-US" dirty="0"/>
+                <a:t>Consultancy</a:t>
+              </a:r>
+            </a:p>
+          </p:txBody>
+        </p:sp>
+      </p:grpSp>
+      <p:grpSp>
+        <p:nvGrpSpPr>
+          <p:cNvPr id="12" name="Group 11">
+            <a:extLst>
+              <a:ext uri="{FF2B5EF4-FFF2-40B4-BE49-F238E27FC236}">
+                <a16:creationId xmlns:a16="http://schemas.microsoft.com/office/drawing/2014/main" id="{8E5E159F-4157-CA5D-FF0E-9F025BD8B80B}"/>
+              </a:ext>
+            </a:extLst>
+          </p:cNvPr>
+          <p:cNvGrpSpPr/>
+          <p:nvPr/>
+        </p:nvGrpSpPr>
+        <p:grpSpPr>
+          <a:xfrm>
+            <a:off x="10471724" y="3604046"/>
+            <a:ext cx="1255201" cy="1407936"/>
+            <a:chOff x="10392666" y="3529144"/>
+            <a:chExt cx="1255201" cy="1407936"/>
+          </a:xfrm>
+        </p:grpSpPr>
+        <p:pic>
+          <p:nvPicPr>
+            <p:cNvPr id="9" name="Picture 8">
+              <a:extLst>
+                <a:ext uri="{FF2B5EF4-FFF2-40B4-BE49-F238E27FC236}">
+                  <a16:creationId xmlns:a16="http://schemas.microsoft.com/office/drawing/2014/main" id="{45EF5FB9-996D-98D8-DA67-BFB8E781982F}"/>
+                </a:ext>
+              </a:extLst>
+            </p:cNvPr>
+            <p:cNvPicPr>
+              <a:picLocks noChangeAspect="1"/>
+            </p:cNvPicPr>
+            <p:nvPr/>
+          </p:nvPicPr>
+          <p:blipFill>
+            <a:blip r:embed="rId3"/>
+            <a:stretch>
+              <a:fillRect/>
+            </a:stretch>
+          </p:blipFill>
+          <p:spPr>
+            <a:xfrm>
+              <a:off x="10392666" y="3529144"/>
+              <a:ext cx="1255201" cy="1255201"/>
+            </a:xfrm>
+            <a:prstGeom prst="rect">
+              <a:avLst/>
+            </a:prstGeom>
+          </p:spPr>
+        </p:pic>
+        <p:sp>
+          <p:nvSpPr>
+            <p:cNvPr id="11" name="TextBox 10">
+              <a:extLst>
+                <a:ext uri="{FF2B5EF4-FFF2-40B4-BE49-F238E27FC236}">
+                  <a16:creationId xmlns:a16="http://schemas.microsoft.com/office/drawing/2014/main" id="{FE4DAB27-0634-9475-0D75-B87F8B8D86F8}"/>
+                </a:ext>
+              </a:extLst>
+            </p:cNvPr>
+            <p:cNvSpPr txBox="1"/>
+            <p:nvPr/>
+          </p:nvSpPr>
+          <p:spPr>
+            <a:xfrm>
+              <a:off x="10394009" y="4567748"/>
+              <a:ext cx="1205651" cy="369332"/>
+            </a:xfrm>
+            <a:prstGeom prst="rect">
+              <a:avLst/>
+            </a:prstGeom>
+            <a:noFill/>
+          </p:spPr>
+          <p:txBody>
+            <a:bodyPr wrap="none" rtlCol="0">
+              <a:spAutoFit/>
+            </a:bodyPr>
+            <a:lstStyle/>
+            <a:p>
+              <a:r>
+                <a:rPr lang="en-US" dirty="0"/>
+                <a:t>Healthcare</a:t>
+              </a:r>
+            </a:p>
+          </p:txBody>
+        </p:sp>
+      </p:grpSp>
+      <p:grpSp>
+        <p:nvGrpSpPr>
+          <p:cNvPr id="15" name="Group 14">
+            <a:extLst>
+              <a:ext uri="{FF2B5EF4-FFF2-40B4-BE49-F238E27FC236}">
+                <a16:creationId xmlns:a16="http://schemas.microsoft.com/office/drawing/2014/main" id="{13EC8E7E-5E6F-7E0B-D12D-A4D92F91FD87}"/>
+              </a:ext>
+            </a:extLst>
+          </p:cNvPr>
+          <p:cNvGrpSpPr/>
+          <p:nvPr/>
+        </p:nvGrpSpPr>
+        <p:grpSpPr>
+          <a:xfrm>
+            <a:off x="10570003" y="548845"/>
+            <a:ext cx="1058642" cy="1411482"/>
+            <a:chOff x="10541018" y="206036"/>
+            <a:chExt cx="1058642" cy="1411482"/>
+          </a:xfrm>
+        </p:grpSpPr>
+        <p:pic>
+          <p:nvPicPr>
+            <p:cNvPr id="5" name="Picture 4">
+              <a:extLst>
+                <a:ext uri="{FF2B5EF4-FFF2-40B4-BE49-F238E27FC236}">
+                  <a16:creationId xmlns:a16="http://schemas.microsoft.com/office/drawing/2014/main" id="{025312EA-5571-C964-B059-8783669AF82F}"/>
+                </a:ext>
+              </a:extLst>
+            </p:cNvPr>
+            <p:cNvPicPr>
+              <a:picLocks noChangeAspect="1"/>
+            </p:cNvPicPr>
+            <p:nvPr/>
+          </p:nvPicPr>
+          <p:blipFill>
+            <a:blip r:embed="rId4"/>
+            <a:stretch>
+              <a:fillRect/>
+            </a:stretch>
+          </p:blipFill>
+          <p:spPr>
+            <a:xfrm>
+              <a:off x="10541018" y="206036"/>
+              <a:ext cx="1058642" cy="1058642"/>
+            </a:xfrm>
+            <a:prstGeom prst="rect">
+              <a:avLst/>
+            </a:prstGeom>
+          </p:spPr>
+        </p:pic>
+        <p:sp>
+          <p:nvSpPr>
+            <p:cNvPr id="14" name="TextBox 13">
+              <a:extLst>
+                <a:ext uri="{FF2B5EF4-FFF2-40B4-BE49-F238E27FC236}">
+                  <a16:creationId xmlns:a16="http://schemas.microsoft.com/office/drawing/2014/main" id="{A8478C41-4DE6-74C2-4A15-A8DB4FD44C4C}"/>
+                </a:ext>
+              </a:extLst>
+            </p:cNvPr>
+            <p:cNvSpPr txBox="1"/>
+            <p:nvPr/>
+          </p:nvSpPr>
+          <p:spPr>
+            <a:xfrm>
+              <a:off x="10614925" y="1248186"/>
+              <a:ext cx="910827" cy="369332"/>
+            </a:xfrm>
+            <a:prstGeom prst="rect">
+              <a:avLst/>
+            </a:prstGeom>
+            <a:noFill/>
+          </p:spPr>
+          <p:txBody>
+            <a:bodyPr wrap="none" rtlCol="0">
+              <a:spAutoFit/>
+            </a:bodyPr>
+            <a:lstStyle/>
+            <a:p>
+              <a:r>
+                <a:rPr lang="en-US" dirty="0"/>
+                <a:t>Finance</a:t>
+              </a:r>
+            </a:p>
+          </p:txBody>
+        </p:sp>
+      </p:grpSp>
+      <p:grpSp>
+        <p:nvGrpSpPr>
+          <p:cNvPr id="19" name="Group 18">
+            <a:extLst>
+              <a:ext uri="{FF2B5EF4-FFF2-40B4-BE49-F238E27FC236}">
+                <a16:creationId xmlns:a16="http://schemas.microsoft.com/office/drawing/2014/main" id="{F74BB214-1075-74CE-AA3B-3367EE6F7A05}"/>
+              </a:ext>
+            </a:extLst>
+          </p:cNvPr>
+          <p:cNvGrpSpPr/>
+          <p:nvPr/>
+        </p:nvGrpSpPr>
+        <p:grpSpPr>
+          <a:xfrm>
+            <a:off x="10312730" y="5083166"/>
+            <a:ext cx="1573188" cy="1272999"/>
+            <a:chOff x="10309343" y="5072017"/>
+            <a:chExt cx="1573188" cy="1272999"/>
+          </a:xfrm>
+        </p:grpSpPr>
+        <p:pic>
+          <p:nvPicPr>
+            <p:cNvPr id="17" name="Picture 16" descr="A black background with a black square&#10;&#10;Description automatically generated with medium confidence">
+              <a:extLst>
+                <a:ext uri="{FF2B5EF4-FFF2-40B4-BE49-F238E27FC236}">
+                  <a16:creationId xmlns:a16="http://schemas.microsoft.com/office/drawing/2014/main" id="{044519FE-2C51-28D2-0798-FD5B63964254}"/>
+                </a:ext>
+              </a:extLst>
+            </p:cNvPr>
+            <p:cNvPicPr>
+              <a:picLocks noChangeAspect="1"/>
+            </p:cNvPicPr>
+            <p:nvPr/>
+          </p:nvPicPr>
+          <p:blipFill>
+            <a:blip r:embed="rId5">
+              <a:extLst>
+                <a:ext uri="{28A0092B-C50C-407E-A947-70E740481C1C}">
+                  <a14:useLocalDpi xmlns:a14="http://schemas.microsoft.com/office/drawing/2010/main" val="0"/>
+                </a:ext>
+              </a:extLst>
+            </a:blip>
+            <a:stretch>
+              <a:fillRect/>
+            </a:stretch>
+          </p:blipFill>
+          <p:spPr>
+            <a:xfrm>
+              <a:off x="10622085" y="5072017"/>
+              <a:ext cx="903667" cy="903667"/>
+            </a:xfrm>
+            <a:prstGeom prst="rect">
+              <a:avLst/>
+            </a:prstGeom>
+          </p:spPr>
+        </p:pic>
+        <p:sp>
+          <p:nvSpPr>
+            <p:cNvPr id="18" name="TextBox 17">
+              <a:extLst>
+                <a:ext uri="{FF2B5EF4-FFF2-40B4-BE49-F238E27FC236}">
+                  <a16:creationId xmlns:a16="http://schemas.microsoft.com/office/drawing/2014/main" id="{AC07301E-439D-8CCC-4107-6A50B7087292}"/>
+                </a:ext>
+              </a:extLst>
+            </p:cNvPr>
+            <p:cNvSpPr txBox="1"/>
+            <p:nvPr/>
+          </p:nvSpPr>
+          <p:spPr>
+            <a:xfrm>
+              <a:off x="10309343" y="5975684"/>
+              <a:ext cx="1573188" cy="369332"/>
+            </a:xfrm>
+            <a:prstGeom prst="rect">
+              <a:avLst/>
+            </a:prstGeom>
+            <a:noFill/>
+          </p:spPr>
+          <p:txBody>
+            <a:bodyPr wrap="none" rtlCol="0">
+              <a:spAutoFit/>
+            </a:bodyPr>
+            <a:lstStyle/>
+            <a:p>
+              <a:r>
+                <a:rPr lang="en-US" dirty="0"/>
+                <a:t>Manufacturing</a:t>
+              </a:r>
+            </a:p>
+          </p:txBody>
+        </p:sp>
+      </p:grpSp>
     </p:spTree>
     <p:extLst>
       <p:ext uri="{BB962C8B-B14F-4D97-AF65-F5344CB8AC3E}">

</xml_diff>

<commit_message>
added animation to what is a DA slide
</commit_message>
<xml_diff>
--- a/WhatIsDataAnalysis.pptx
+++ b/WhatIsDataAnalysis.pptx
@@ -11,6 +11,7 @@
     <p:sldId id="259" r:id="rId5"/>
     <p:sldId id="260" r:id="rId6"/>
     <p:sldId id="261" r:id="rId7"/>
+    <p:sldId id="262" r:id="rId8"/>
   </p:sldIdLst>
   <p:sldSz cx="12192000" cy="6858000"/>
   <p:notesSz cx="6858000" cy="9144000"/>
@@ -7634,6 +7635,577 @@
 </p:sld>
 </file>
 
+<file path=ppt/slides/slide7.xml><?xml version="1.0" encoding="utf-8"?>
+<p:sld xmlns:a="http://schemas.openxmlformats.org/drawingml/2006/main" xmlns:r="http://schemas.openxmlformats.org/officeDocument/2006/relationships" xmlns:p="http://schemas.openxmlformats.org/presentationml/2006/main">
+  <p:cSld>
+    <p:spTree>
+      <p:nvGrpSpPr>
+        <p:cNvPr id="1" name=""/>
+        <p:cNvGrpSpPr/>
+        <p:nvPr/>
+      </p:nvGrpSpPr>
+      <p:grpSpPr>
+        <a:xfrm>
+          <a:off x="0" y="0"/>
+          <a:ext cx="0" cy="0"/>
+          <a:chOff x="0" y="0"/>
+          <a:chExt cx="0" cy="0"/>
+        </a:xfrm>
+      </p:grpSpPr>
+      <p:sp>
+        <p:nvSpPr>
+          <p:cNvPr id="2" name="Title 1">
+            <a:extLst>
+              <a:ext uri="{FF2B5EF4-FFF2-40B4-BE49-F238E27FC236}">
+                <a16:creationId xmlns:a16="http://schemas.microsoft.com/office/drawing/2014/main" id="{4F4BA0F4-1893-50DD-D671-450D5C8F005C}"/>
+              </a:ext>
+            </a:extLst>
+          </p:cNvPr>
+          <p:cNvSpPr>
+            <a:spLocks noGrp="1"/>
+          </p:cNvSpPr>
+          <p:nvPr>
+            <p:ph type="title"/>
+          </p:nvPr>
+        </p:nvSpPr>
+        <p:spPr/>
+        <p:txBody>
+          <a:bodyPr/>
+          <a:lstStyle/>
+          <a:p>
+            <a:r>
+              <a:rPr lang="en-US" dirty="0"/>
+              <a:t>What is a data analyst?</a:t>
+            </a:r>
+          </a:p>
+        </p:txBody>
+      </p:sp>
+      <p:cxnSp>
+        <p:nvCxnSpPr>
+          <p:cNvPr id="5" name="Straight Arrow Connector 4">
+            <a:extLst>
+              <a:ext uri="{FF2B5EF4-FFF2-40B4-BE49-F238E27FC236}">
+                <a16:creationId xmlns:a16="http://schemas.microsoft.com/office/drawing/2014/main" id="{2D4B4876-F261-B12C-4C71-37C9DC441CAA}"/>
+              </a:ext>
+            </a:extLst>
+          </p:cNvPr>
+          <p:cNvCxnSpPr/>
+          <p:nvPr/>
+        </p:nvCxnSpPr>
+        <p:spPr>
+          <a:xfrm flipH="1" flipV="1">
+            <a:off x="1608667" y="1583267"/>
+            <a:ext cx="29633" cy="4588933"/>
+          </a:xfrm>
+          <a:prstGeom prst="straightConnector1">
+            <a:avLst/>
+          </a:prstGeom>
+          <a:ln w="76200">
+            <a:solidFill>
+              <a:schemeClr val="bg1">
+                <a:lumMod val="50000"/>
+              </a:schemeClr>
+            </a:solidFill>
+            <a:tailEnd type="triangle"/>
+          </a:ln>
+        </p:spPr>
+        <p:style>
+          <a:lnRef idx="1">
+            <a:schemeClr val="accent1"/>
+          </a:lnRef>
+          <a:fillRef idx="0">
+            <a:schemeClr val="accent1"/>
+          </a:fillRef>
+          <a:effectRef idx="0">
+            <a:schemeClr val="accent1"/>
+          </a:effectRef>
+          <a:fontRef idx="minor">
+            <a:schemeClr val="tx1"/>
+          </a:fontRef>
+        </p:style>
+      </p:cxnSp>
+      <p:cxnSp>
+        <p:nvCxnSpPr>
+          <p:cNvPr id="6" name="Straight Arrow Connector 5">
+            <a:extLst>
+              <a:ext uri="{FF2B5EF4-FFF2-40B4-BE49-F238E27FC236}">
+                <a16:creationId xmlns:a16="http://schemas.microsoft.com/office/drawing/2014/main" id="{41CE995A-1286-DB75-2DFA-DA17BC83BEE2}"/>
+              </a:ext>
+            </a:extLst>
+          </p:cNvPr>
+          <p:cNvCxnSpPr>
+            <a:cxnSpLocks/>
+          </p:cNvCxnSpPr>
+          <p:nvPr/>
+        </p:nvCxnSpPr>
+        <p:spPr>
+          <a:xfrm>
+            <a:off x="1244598" y="5617632"/>
+            <a:ext cx="7454902" cy="59268"/>
+          </a:xfrm>
+          <a:prstGeom prst="straightConnector1">
+            <a:avLst/>
+          </a:prstGeom>
+          <a:ln w="76200">
+            <a:solidFill>
+              <a:schemeClr val="bg1">
+                <a:lumMod val="50000"/>
+              </a:schemeClr>
+            </a:solidFill>
+            <a:tailEnd type="triangle"/>
+          </a:ln>
+        </p:spPr>
+        <p:style>
+          <a:lnRef idx="1">
+            <a:schemeClr val="accent1"/>
+          </a:lnRef>
+          <a:fillRef idx="0">
+            <a:schemeClr val="accent1"/>
+          </a:fillRef>
+          <a:effectRef idx="0">
+            <a:schemeClr val="accent1"/>
+          </a:effectRef>
+          <a:fontRef idx="minor">
+            <a:schemeClr val="tx1"/>
+          </a:fontRef>
+        </p:style>
+      </p:cxnSp>
+      <p:sp>
+        <p:nvSpPr>
+          <p:cNvPr id="11" name="TextBox 10">
+            <a:extLst>
+              <a:ext uri="{FF2B5EF4-FFF2-40B4-BE49-F238E27FC236}">
+                <a16:creationId xmlns:a16="http://schemas.microsoft.com/office/drawing/2014/main" id="{4B5527BE-C4E2-169E-7E17-3468E01D5214}"/>
+              </a:ext>
+            </a:extLst>
+          </p:cNvPr>
+          <p:cNvSpPr txBox="1"/>
+          <p:nvPr/>
+        </p:nvSpPr>
+        <p:spPr>
+          <a:xfrm>
+            <a:off x="376767" y="1553633"/>
+            <a:ext cx="1032142" cy="369332"/>
+          </a:xfrm>
+          <a:prstGeom prst="rect">
+            <a:avLst/>
+          </a:prstGeom>
+          <a:noFill/>
+        </p:spPr>
+        <p:txBody>
+          <a:bodyPr wrap="none" rtlCol="0">
+            <a:spAutoFit/>
+          </a:bodyPr>
+          <a:lstStyle/>
+          <a:p>
+            <a:r>
+              <a:rPr lang="en-US" b="1" dirty="0">
+                <a:solidFill>
+                  <a:schemeClr val="bg1">
+                    <a:lumMod val="50000"/>
+                  </a:schemeClr>
+                </a:solidFill>
+              </a:rPr>
+              <a:t>Statistics</a:t>
+            </a:r>
+          </a:p>
+        </p:txBody>
+      </p:sp>
+      <p:sp>
+        <p:nvSpPr>
+          <p:cNvPr id="12" name="TextBox 11">
+            <a:extLst>
+              <a:ext uri="{FF2B5EF4-FFF2-40B4-BE49-F238E27FC236}">
+                <a16:creationId xmlns:a16="http://schemas.microsoft.com/office/drawing/2014/main" id="{9E54D91A-8F1B-1421-F067-FB8C5A7F2FAD}"/>
+              </a:ext>
+            </a:extLst>
+          </p:cNvPr>
+          <p:cNvSpPr txBox="1"/>
+          <p:nvPr/>
+        </p:nvSpPr>
+        <p:spPr>
+          <a:xfrm>
+            <a:off x="7138749" y="5866603"/>
+            <a:ext cx="1887761" cy="369332"/>
+          </a:xfrm>
+          <a:prstGeom prst="rect">
+            <a:avLst/>
+          </a:prstGeom>
+          <a:noFill/>
+        </p:spPr>
+        <p:txBody>
+          <a:bodyPr wrap="none" rtlCol="0">
+            <a:spAutoFit/>
+          </a:bodyPr>
+          <a:lstStyle/>
+          <a:p>
+            <a:r>
+              <a:rPr lang="en-US" b="1" dirty="0">
+                <a:solidFill>
+                  <a:schemeClr val="bg1">
+                    <a:lumMod val="50000"/>
+                  </a:schemeClr>
+                </a:solidFill>
+              </a:rPr>
+              <a:t>Computer Science</a:t>
+            </a:r>
+          </a:p>
+        </p:txBody>
+      </p:sp>
+      <p:sp>
+        <p:nvSpPr>
+          <p:cNvPr id="13" name="TextBox 12">
+            <a:extLst>
+              <a:ext uri="{FF2B5EF4-FFF2-40B4-BE49-F238E27FC236}">
+                <a16:creationId xmlns:a16="http://schemas.microsoft.com/office/drawing/2014/main" id="{F368E159-BD43-0DBF-E3EA-890D9CBDE419}"/>
+              </a:ext>
+            </a:extLst>
+          </p:cNvPr>
+          <p:cNvSpPr txBox="1"/>
+          <p:nvPr/>
+        </p:nvSpPr>
+        <p:spPr>
+          <a:xfrm>
+            <a:off x="2150534" y="1791494"/>
+            <a:ext cx="1292854" cy="369332"/>
+          </a:xfrm>
+          <a:prstGeom prst="rect">
+            <a:avLst/>
+          </a:prstGeom>
+          <a:solidFill>
+            <a:srgbClr val="92D050"/>
+          </a:solidFill>
+          <a:effectLst>
+            <a:glow rad="228600">
+              <a:schemeClr val="accent6">
+                <a:satMod val="175000"/>
+                <a:alpha val="40000"/>
+              </a:schemeClr>
+            </a:glow>
+          </a:effectLst>
+        </p:spPr>
+        <p:txBody>
+          <a:bodyPr wrap="none" rtlCol="0">
+            <a:spAutoFit/>
+          </a:bodyPr>
+          <a:lstStyle/>
+          <a:p>
+            <a:r>
+              <a:rPr lang="en-US" dirty="0">
+                <a:solidFill>
+                  <a:schemeClr val="bg1"/>
+                </a:solidFill>
+              </a:rPr>
+              <a:t>Statisticians</a:t>
+            </a:r>
+          </a:p>
+        </p:txBody>
+      </p:sp>
+      <p:sp>
+        <p:nvSpPr>
+          <p:cNvPr id="14" name="TextBox 13">
+            <a:extLst>
+              <a:ext uri="{FF2B5EF4-FFF2-40B4-BE49-F238E27FC236}">
+                <a16:creationId xmlns:a16="http://schemas.microsoft.com/office/drawing/2014/main" id="{3434D04E-F9CF-CB7C-E7B6-1466AE31B65D}"/>
+              </a:ext>
+            </a:extLst>
+          </p:cNvPr>
+          <p:cNvSpPr txBox="1"/>
+          <p:nvPr/>
+        </p:nvSpPr>
+        <p:spPr>
+          <a:xfrm>
+            <a:off x="6026426" y="4985836"/>
+            <a:ext cx="2056204" cy="369332"/>
+          </a:xfrm>
+          <a:prstGeom prst="rect">
+            <a:avLst/>
+          </a:prstGeom>
+          <a:solidFill>
+            <a:srgbClr val="FFC000"/>
+          </a:solidFill>
+          <a:effectLst>
+            <a:glow rad="228600">
+              <a:schemeClr val="accent4">
+                <a:satMod val="175000"/>
+                <a:alpha val="40000"/>
+              </a:schemeClr>
+            </a:glow>
+          </a:effectLst>
+        </p:spPr>
+        <p:txBody>
+          <a:bodyPr wrap="none" rtlCol="0">
+            <a:spAutoFit/>
+          </a:bodyPr>
+          <a:lstStyle/>
+          <a:p>
+            <a:r>
+              <a:rPr lang="en-US" dirty="0">
+                <a:solidFill>
+                  <a:schemeClr val="bg1"/>
+                </a:solidFill>
+              </a:rPr>
+              <a:t>Computer Scientists</a:t>
+            </a:r>
+          </a:p>
+        </p:txBody>
+      </p:sp>
+      <p:sp>
+        <p:nvSpPr>
+          <p:cNvPr id="15" name="TextBox 14">
+            <a:extLst>
+              <a:ext uri="{FF2B5EF4-FFF2-40B4-BE49-F238E27FC236}">
+                <a16:creationId xmlns:a16="http://schemas.microsoft.com/office/drawing/2014/main" id="{692D7AA9-B7AE-A12E-40BC-6A913D3E3A1E}"/>
+              </a:ext>
+            </a:extLst>
+          </p:cNvPr>
+          <p:cNvSpPr txBox="1"/>
+          <p:nvPr/>
+        </p:nvSpPr>
+        <p:spPr>
+          <a:xfrm>
+            <a:off x="4615529" y="3083350"/>
+            <a:ext cx="1358064" cy="369332"/>
+          </a:xfrm>
+          <a:prstGeom prst="rect">
+            <a:avLst/>
+          </a:prstGeom>
+          <a:solidFill>
+            <a:srgbClr val="0070C0"/>
+          </a:solidFill>
+          <a:effectLst>
+            <a:glow rad="228600">
+              <a:schemeClr val="accent5">
+                <a:satMod val="175000"/>
+                <a:alpha val="40000"/>
+              </a:schemeClr>
+            </a:glow>
+          </a:effectLst>
+        </p:spPr>
+        <p:txBody>
+          <a:bodyPr wrap="none" rtlCol="0">
+            <a:spAutoFit/>
+          </a:bodyPr>
+          <a:lstStyle/>
+          <a:p>
+            <a:r>
+              <a:rPr lang="en-US" dirty="0">
+                <a:solidFill>
+                  <a:schemeClr val="bg1"/>
+                </a:solidFill>
+              </a:rPr>
+              <a:t>Data Analyst</a:t>
+            </a:r>
+          </a:p>
+        </p:txBody>
+      </p:sp>
+    </p:spTree>
+    <p:extLst>
+      <p:ext uri="{BB962C8B-B14F-4D97-AF65-F5344CB8AC3E}">
+        <p14:creationId xmlns:p14="http://schemas.microsoft.com/office/powerpoint/2010/main" val="2521230684"/>
+      </p:ext>
+    </p:extLst>
+  </p:cSld>
+  <p:clrMapOvr>
+    <a:masterClrMapping/>
+  </p:clrMapOvr>
+  <p:timing>
+    <p:tnLst>
+      <p:par>
+        <p:cTn id="1" dur="indefinite" restart="never" nodeType="tmRoot">
+          <p:childTnLst>
+            <p:seq concurrent="1" nextAc="seek">
+              <p:cTn id="2" dur="indefinite" nodeType="mainSeq">
+                <p:childTnLst>
+                  <p:par>
+                    <p:cTn id="3" fill="hold">
+                      <p:stCondLst>
+                        <p:cond delay="indefinite"/>
+                      </p:stCondLst>
+                      <p:childTnLst>
+                        <p:par>
+                          <p:cTn id="4" fill="hold">
+                            <p:stCondLst>
+                              <p:cond delay="0"/>
+                            </p:stCondLst>
+                            <p:childTnLst>
+                              <p:par>
+                                <p:cTn id="5" presetID="10" presetClass="entr" presetSubtype="0" fill="hold" grpId="0" nodeType="clickEffect">
+                                  <p:stCondLst>
+                                    <p:cond delay="0"/>
+                                  </p:stCondLst>
+                                  <p:childTnLst>
+                                    <p:set>
+                                      <p:cBhvr>
+                                        <p:cTn id="6" dur="1" fill="hold">
+                                          <p:stCondLst>
+                                            <p:cond delay="0"/>
+                                          </p:stCondLst>
+                                        </p:cTn>
+                                        <p:tgtEl>
+                                          <p:spTgt spid="14"/>
+                                        </p:tgtEl>
+                                        <p:attrNameLst>
+                                          <p:attrName>style.visibility</p:attrName>
+                                        </p:attrNameLst>
+                                      </p:cBhvr>
+                                      <p:to>
+                                        <p:strVal val="visible"/>
+                                      </p:to>
+                                    </p:set>
+                                    <p:animEffect transition="in" filter="fade">
+                                      <p:cBhvr>
+                                        <p:cTn id="7" dur="500"/>
+                                        <p:tgtEl>
+                                          <p:spTgt spid="14"/>
+                                        </p:tgtEl>
+                                      </p:cBhvr>
+                                    </p:animEffect>
+                                  </p:childTnLst>
+                                </p:cTn>
+                              </p:par>
+                            </p:childTnLst>
+                          </p:cTn>
+                        </p:par>
+                      </p:childTnLst>
+                    </p:cTn>
+                  </p:par>
+                  <p:par>
+                    <p:cTn id="8" fill="hold">
+                      <p:stCondLst>
+                        <p:cond delay="indefinite"/>
+                      </p:stCondLst>
+                      <p:childTnLst>
+                        <p:par>
+                          <p:cTn id="9" fill="hold">
+                            <p:stCondLst>
+                              <p:cond delay="0"/>
+                            </p:stCondLst>
+                            <p:childTnLst>
+                              <p:par>
+                                <p:cTn id="10" presetID="10" presetClass="entr" presetSubtype="0" fill="hold" grpId="0" nodeType="clickEffect">
+                                  <p:stCondLst>
+                                    <p:cond delay="0"/>
+                                  </p:stCondLst>
+                                  <p:childTnLst>
+                                    <p:set>
+                                      <p:cBhvr>
+                                        <p:cTn id="11" dur="1" fill="hold">
+                                          <p:stCondLst>
+                                            <p:cond delay="0"/>
+                                          </p:stCondLst>
+                                        </p:cTn>
+                                        <p:tgtEl>
+                                          <p:spTgt spid="13"/>
+                                        </p:tgtEl>
+                                        <p:attrNameLst>
+                                          <p:attrName>style.visibility</p:attrName>
+                                        </p:attrNameLst>
+                                      </p:cBhvr>
+                                      <p:to>
+                                        <p:strVal val="visible"/>
+                                      </p:to>
+                                    </p:set>
+                                    <p:animEffect transition="in" filter="fade">
+                                      <p:cBhvr>
+                                        <p:cTn id="12" dur="500"/>
+                                        <p:tgtEl>
+                                          <p:spTgt spid="13"/>
+                                        </p:tgtEl>
+                                      </p:cBhvr>
+                                    </p:animEffect>
+                                  </p:childTnLst>
+                                </p:cTn>
+                              </p:par>
+                            </p:childTnLst>
+                          </p:cTn>
+                        </p:par>
+                      </p:childTnLst>
+                    </p:cTn>
+                  </p:par>
+                  <p:par>
+                    <p:cTn id="13" fill="hold">
+                      <p:stCondLst>
+                        <p:cond delay="indefinite"/>
+                      </p:stCondLst>
+                      <p:childTnLst>
+                        <p:par>
+                          <p:cTn id="14" fill="hold">
+                            <p:stCondLst>
+                              <p:cond delay="0"/>
+                            </p:stCondLst>
+                            <p:childTnLst>
+                              <p:par>
+                                <p:cTn id="15" presetID="10" presetClass="entr" presetSubtype="0" fill="hold" grpId="0" nodeType="clickEffect">
+                                  <p:stCondLst>
+                                    <p:cond delay="0"/>
+                                  </p:stCondLst>
+                                  <p:childTnLst>
+                                    <p:set>
+                                      <p:cBhvr>
+                                        <p:cTn id="16" dur="1" fill="hold">
+                                          <p:stCondLst>
+                                            <p:cond delay="0"/>
+                                          </p:stCondLst>
+                                        </p:cTn>
+                                        <p:tgtEl>
+                                          <p:spTgt spid="15"/>
+                                        </p:tgtEl>
+                                        <p:attrNameLst>
+                                          <p:attrName>style.visibility</p:attrName>
+                                        </p:attrNameLst>
+                                      </p:cBhvr>
+                                      <p:to>
+                                        <p:strVal val="visible"/>
+                                      </p:to>
+                                    </p:set>
+                                    <p:animEffect transition="in" filter="fade">
+                                      <p:cBhvr>
+                                        <p:cTn id="17" dur="500"/>
+                                        <p:tgtEl>
+                                          <p:spTgt spid="15"/>
+                                        </p:tgtEl>
+                                      </p:cBhvr>
+                                    </p:animEffect>
+                                  </p:childTnLst>
+                                </p:cTn>
+                              </p:par>
+                            </p:childTnLst>
+                          </p:cTn>
+                        </p:par>
+                      </p:childTnLst>
+                    </p:cTn>
+                  </p:par>
+                </p:childTnLst>
+              </p:cTn>
+              <p:prevCondLst>
+                <p:cond evt="onPrev" delay="0">
+                  <p:tgtEl>
+                    <p:sldTgt/>
+                  </p:tgtEl>
+                </p:cond>
+              </p:prevCondLst>
+              <p:nextCondLst>
+                <p:cond evt="onNext" delay="0">
+                  <p:tgtEl>
+                    <p:sldTgt/>
+                  </p:tgtEl>
+                </p:cond>
+              </p:nextCondLst>
+            </p:seq>
+          </p:childTnLst>
+        </p:cTn>
+      </p:par>
+    </p:tnLst>
+    <p:bldLst>
+      <p:bldP spid="13" grpId="0" animBg="1"/>
+      <p:bldP spid="14" grpId="0" animBg="1"/>
+      <p:bldP spid="15" grpId="0" animBg="1"/>
+    </p:bldLst>
+  </p:timing>
+</p:sld>
+</file>
+
 <file path=ppt/theme/theme1.xml><?xml version="1.0" encoding="utf-8"?>
 <a:theme xmlns:a="http://schemas.openxmlformats.org/drawingml/2006/main" name="Office Theme">
   <a:themeElements>

</xml_diff>

<commit_message>
expertise slide with icons
</commit_message>
<xml_diff>
--- a/WhatIsDataAnalysis.pptx
+++ b/WhatIsDataAnalysis.pptx
@@ -13,6 +13,7 @@
     <p:sldId id="261" r:id="rId7"/>
     <p:sldId id="262" r:id="rId8"/>
     <p:sldId id="263" r:id="rId9"/>
+    <p:sldId id="264" r:id="rId10"/>
   </p:sldIdLst>
   <p:sldSz cx="12192000" cy="6858000"/>
   <p:notesSz cx="6858000" cy="9144000"/>
@@ -8639,6 +8640,518 @@
 </p:sld>
 </file>
 
+<file path=ppt/slides/slide9.xml><?xml version="1.0" encoding="utf-8"?>
+<p:sld xmlns:a="http://schemas.openxmlformats.org/drawingml/2006/main" xmlns:r="http://schemas.openxmlformats.org/officeDocument/2006/relationships" xmlns:p="http://schemas.openxmlformats.org/presentationml/2006/main">
+  <p:cSld>
+    <p:spTree>
+      <p:nvGrpSpPr>
+        <p:cNvPr id="1" name=""/>
+        <p:cNvGrpSpPr/>
+        <p:nvPr/>
+      </p:nvGrpSpPr>
+      <p:grpSpPr>
+        <a:xfrm>
+          <a:off x="0" y="0"/>
+          <a:ext cx="0" cy="0"/>
+          <a:chOff x="0" y="0"/>
+          <a:chExt cx="0" cy="0"/>
+        </a:xfrm>
+      </p:grpSpPr>
+      <p:sp>
+        <p:nvSpPr>
+          <p:cNvPr id="2" name="Title 1">
+            <a:extLst>
+              <a:ext uri="{FF2B5EF4-FFF2-40B4-BE49-F238E27FC236}">
+                <a16:creationId xmlns:a16="http://schemas.microsoft.com/office/drawing/2014/main" id="{5217E6C7-1ADC-4C18-CF88-9C4FD439758B}"/>
+              </a:ext>
+            </a:extLst>
+          </p:cNvPr>
+          <p:cNvSpPr>
+            <a:spLocks noGrp="1"/>
+          </p:cNvSpPr>
+          <p:nvPr>
+            <p:ph type="title"/>
+          </p:nvPr>
+        </p:nvSpPr>
+        <p:spPr/>
+        <p:txBody>
+          <a:bodyPr/>
+          <a:lstStyle/>
+          <a:p>
+            <a:r>
+              <a:rPr lang="en-US" dirty="0"/>
+              <a:t>Expertise of data analysts</a:t>
+            </a:r>
+          </a:p>
+        </p:txBody>
+      </p:sp>
+      <p:grpSp>
+        <p:nvGrpSpPr>
+          <p:cNvPr id="21" name="Group 20">
+            <a:extLst>
+              <a:ext uri="{FF2B5EF4-FFF2-40B4-BE49-F238E27FC236}">
+                <a16:creationId xmlns:a16="http://schemas.microsoft.com/office/drawing/2014/main" id="{CCA4F6E2-2449-9ADA-758A-72B7B827F2A4}"/>
+              </a:ext>
+            </a:extLst>
+          </p:cNvPr>
+          <p:cNvGrpSpPr/>
+          <p:nvPr/>
+        </p:nvGrpSpPr>
+        <p:grpSpPr>
+          <a:xfrm>
+            <a:off x="774779" y="2679698"/>
+            <a:ext cx="1108974" cy="2000999"/>
+            <a:chOff x="355679" y="2285999"/>
+            <a:chExt cx="1108974" cy="2000999"/>
+          </a:xfrm>
+        </p:grpSpPr>
+        <p:pic>
+          <p:nvPicPr>
+            <p:cNvPr id="5" name="Picture 4" descr="A black background with a black square&#10;&#10;Description automatically generated with medium confidence">
+              <a:extLst>
+                <a:ext uri="{FF2B5EF4-FFF2-40B4-BE49-F238E27FC236}">
+                  <a16:creationId xmlns:a16="http://schemas.microsoft.com/office/drawing/2014/main" id="{F21F773A-6E3F-96BA-5C42-C124C3C13282}"/>
+                </a:ext>
+              </a:extLst>
+            </p:cNvPr>
+            <p:cNvPicPr>
+              <a:picLocks noChangeAspect="1"/>
+            </p:cNvPicPr>
+            <p:nvPr/>
+          </p:nvPicPr>
+          <p:blipFill>
+            <a:blip r:embed="rId2">
+              <a:extLst>
+                <a:ext uri="{28A0092B-C50C-407E-A947-70E740481C1C}">
+                  <a14:useLocalDpi xmlns:a14="http://schemas.microsoft.com/office/drawing/2010/main" val="0"/>
+                </a:ext>
+              </a:extLst>
+            </a:blip>
+            <a:stretch>
+              <a:fillRect/>
+            </a:stretch>
+          </p:blipFill>
+          <p:spPr>
+            <a:xfrm>
+              <a:off x="355679" y="2285999"/>
+              <a:ext cx="1108974" cy="1108974"/>
+            </a:xfrm>
+            <a:prstGeom prst="rect">
+              <a:avLst/>
+            </a:prstGeom>
+          </p:spPr>
+        </p:pic>
+        <p:sp>
+          <p:nvSpPr>
+            <p:cNvPr id="16" name="TextBox 15">
+              <a:extLst>
+                <a:ext uri="{FF2B5EF4-FFF2-40B4-BE49-F238E27FC236}">
+                  <a16:creationId xmlns:a16="http://schemas.microsoft.com/office/drawing/2014/main" id="{C1F16442-2FBB-B5EF-EDC4-0242393EF290}"/>
+                </a:ext>
+              </a:extLst>
+            </p:cNvPr>
+            <p:cNvSpPr txBox="1"/>
+            <p:nvPr/>
+          </p:nvSpPr>
+          <p:spPr>
+            <a:xfrm>
+              <a:off x="409068" y="3640667"/>
+              <a:ext cx="1002197" cy="646331"/>
+            </a:xfrm>
+            <a:prstGeom prst="rect">
+              <a:avLst/>
+            </a:prstGeom>
+            <a:noFill/>
+          </p:spPr>
+          <p:txBody>
+            <a:bodyPr wrap="none" rtlCol="0">
+              <a:spAutoFit/>
+            </a:bodyPr>
+            <a:lstStyle/>
+            <a:p>
+              <a:r>
+                <a:rPr lang="en-US" dirty="0"/>
+                <a:t>Machine</a:t>
+              </a:r>
+            </a:p>
+            <a:p>
+              <a:r>
+                <a:rPr lang="en-US" dirty="0"/>
+                <a:t>Learning</a:t>
+              </a:r>
+            </a:p>
+          </p:txBody>
+        </p:sp>
+      </p:grpSp>
+      <p:grpSp>
+        <p:nvGrpSpPr>
+          <p:cNvPr id="22" name="Group 21">
+            <a:extLst>
+              <a:ext uri="{FF2B5EF4-FFF2-40B4-BE49-F238E27FC236}">
+                <a16:creationId xmlns:a16="http://schemas.microsoft.com/office/drawing/2014/main" id="{F112E513-383A-A7DB-1983-D1C79C1735C6}"/>
+              </a:ext>
+            </a:extLst>
+          </p:cNvPr>
+          <p:cNvGrpSpPr/>
+          <p:nvPr/>
+        </p:nvGrpSpPr>
+        <p:grpSpPr>
+          <a:xfrm>
+            <a:off x="2932261" y="2628818"/>
+            <a:ext cx="1143000" cy="1741013"/>
+            <a:chOff x="2831051" y="2268986"/>
+            <a:chExt cx="1143000" cy="1741013"/>
+          </a:xfrm>
+        </p:grpSpPr>
+        <p:pic>
+          <p:nvPicPr>
+            <p:cNvPr id="7" name="Picture 6" descr="A black background with a black square&#10;&#10;Description automatically generated with medium confidence">
+              <a:extLst>
+                <a:ext uri="{FF2B5EF4-FFF2-40B4-BE49-F238E27FC236}">
+                  <a16:creationId xmlns:a16="http://schemas.microsoft.com/office/drawing/2014/main" id="{CB96C227-8368-7202-DA29-A5839368673B}"/>
+                </a:ext>
+              </a:extLst>
+            </p:cNvPr>
+            <p:cNvPicPr>
+              <a:picLocks noChangeAspect="1"/>
+            </p:cNvPicPr>
+            <p:nvPr/>
+          </p:nvPicPr>
+          <p:blipFill>
+            <a:blip r:embed="rId3">
+              <a:extLst>
+                <a:ext uri="{28A0092B-C50C-407E-A947-70E740481C1C}">
+                  <a14:useLocalDpi xmlns:a14="http://schemas.microsoft.com/office/drawing/2010/main" val="0"/>
+                </a:ext>
+              </a:extLst>
+            </a:blip>
+            <a:stretch>
+              <a:fillRect/>
+            </a:stretch>
+          </p:blipFill>
+          <p:spPr>
+            <a:xfrm>
+              <a:off x="2831051" y="2268986"/>
+              <a:ext cx="1143000" cy="1143000"/>
+            </a:xfrm>
+            <a:prstGeom prst="rect">
+              <a:avLst/>
+            </a:prstGeom>
+          </p:spPr>
+        </p:pic>
+        <p:sp>
+          <p:nvSpPr>
+            <p:cNvPr id="17" name="TextBox 16">
+              <a:extLst>
+                <a:ext uri="{FF2B5EF4-FFF2-40B4-BE49-F238E27FC236}">
+                  <a16:creationId xmlns:a16="http://schemas.microsoft.com/office/drawing/2014/main" id="{F8D4EF62-1165-6186-92DE-B5FDEDDC76C5}"/>
+                </a:ext>
+              </a:extLst>
+            </p:cNvPr>
+            <p:cNvSpPr txBox="1"/>
+            <p:nvPr/>
+          </p:nvSpPr>
+          <p:spPr>
+            <a:xfrm>
+              <a:off x="2898791" y="3640667"/>
+              <a:ext cx="1007520" cy="369332"/>
+            </a:xfrm>
+            <a:prstGeom prst="rect">
+              <a:avLst/>
+            </a:prstGeom>
+            <a:noFill/>
+          </p:spPr>
+          <p:txBody>
+            <a:bodyPr wrap="none" rtlCol="0">
+              <a:spAutoFit/>
+            </a:bodyPr>
+            <a:lstStyle/>
+            <a:p>
+              <a:r>
+                <a:rPr lang="en-US" dirty="0"/>
+                <a:t>Statistics</a:t>
+              </a:r>
+            </a:p>
+          </p:txBody>
+        </p:sp>
+      </p:grpSp>
+      <p:grpSp>
+        <p:nvGrpSpPr>
+          <p:cNvPr id="23" name="Group 22">
+            <a:extLst>
+              <a:ext uri="{FF2B5EF4-FFF2-40B4-BE49-F238E27FC236}">
+                <a16:creationId xmlns:a16="http://schemas.microsoft.com/office/drawing/2014/main" id="{2E6D6539-7773-EDD9-2385-FC4EAA8D7924}"/>
+              </a:ext>
+            </a:extLst>
+          </p:cNvPr>
+          <p:cNvGrpSpPr/>
+          <p:nvPr/>
+        </p:nvGrpSpPr>
+        <p:grpSpPr>
+          <a:xfrm>
+            <a:off x="5123769" y="2628818"/>
+            <a:ext cx="1414746" cy="1741013"/>
+            <a:chOff x="5015044" y="2268986"/>
+            <a:chExt cx="1414746" cy="1741013"/>
+          </a:xfrm>
+        </p:grpSpPr>
+        <p:pic>
+          <p:nvPicPr>
+            <p:cNvPr id="9" name="Picture 8" descr="A black square with a black background with a black square with a black square with white crosses and lines&#10;&#10;Description automatically generated with medium confidence">
+              <a:extLst>
+                <a:ext uri="{FF2B5EF4-FFF2-40B4-BE49-F238E27FC236}">
+                  <a16:creationId xmlns:a16="http://schemas.microsoft.com/office/drawing/2014/main" id="{B3A0A06D-84FB-D429-3F9C-0BBE86628CFC}"/>
+                </a:ext>
+              </a:extLst>
+            </p:cNvPr>
+            <p:cNvPicPr>
+              <a:picLocks noChangeAspect="1"/>
+            </p:cNvPicPr>
+            <p:nvPr/>
+          </p:nvPicPr>
+          <p:blipFill>
+            <a:blip r:embed="rId4">
+              <a:extLst>
+                <a:ext uri="{28A0092B-C50C-407E-A947-70E740481C1C}">
+                  <a14:useLocalDpi xmlns:a14="http://schemas.microsoft.com/office/drawing/2010/main" val="0"/>
+                </a:ext>
+              </a:extLst>
+            </a:blip>
+            <a:stretch>
+              <a:fillRect/>
+            </a:stretch>
+          </p:blipFill>
+          <p:spPr>
+            <a:xfrm>
+              <a:off x="5150917" y="2268986"/>
+              <a:ext cx="1143000" cy="1143000"/>
+            </a:xfrm>
+            <a:prstGeom prst="rect">
+              <a:avLst/>
+            </a:prstGeom>
+          </p:spPr>
+        </p:pic>
+        <p:sp>
+          <p:nvSpPr>
+            <p:cNvPr id="18" name="TextBox 17">
+              <a:extLst>
+                <a:ext uri="{FF2B5EF4-FFF2-40B4-BE49-F238E27FC236}">
+                  <a16:creationId xmlns:a16="http://schemas.microsoft.com/office/drawing/2014/main" id="{5F9E0A4D-6CF5-63F7-05C0-0FA17DECEBB3}"/>
+                </a:ext>
+              </a:extLst>
+            </p:cNvPr>
+            <p:cNvSpPr txBox="1"/>
+            <p:nvPr/>
+          </p:nvSpPr>
+          <p:spPr>
+            <a:xfrm>
+              <a:off x="5015044" y="3640667"/>
+              <a:ext cx="1414746" cy="369332"/>
+            </a:xfrm>
+            <a:prstGeom prst="rect">
+              <a:avLst/>
+            </a:prstGeom>
+            <a:noFill/>
+          </p:spPr>
+          <p:txBody>
+            <a:bodyPr wrap="none" rtlCol="0">
+              <a:spAutoFit/>
+            </a:bodyPr>
+            <a:lstStyle/>
+            <a:p>
+              <a:r>
+                <a:rPr lang="en-US" dirty="0"/>
+                <a:t>Mathematics</a:t>
+              </a:r>
+            </a:p>
+          </p:txBody>
+        </p:sp>
+      </p:grpSp>
+      <p:grpSp>
+        <p:nvGrpSpPr>
+          <p:cNvPr id="24" name="Group 23">
+            <a:extLst>
+              <a:ext uri="{FF2B5EF4-FFF2-40B4-BE49-F238E27FC236}">
+                <a16:creationId xmlns:a16="http://schemas.microsoft.com/office/drawing/2014/main" id="{61C3F604-6188-A74F-1EF5-54FC6CBC6F53}"/>
+              </a:ext>
+            </a:extLst>
+          </p:cNvPr>
+          <p:cNvGrpSpPr/>
+          <p:nvPr/>
+        </p:nvGrpSpPr>
+        <p:grpSpPr>
+          <a:xfrm>
+            <a:off x="7587023" y="2628818"/>
+            <a:ext cx="1448986" cy="1741013"/>
+            <a:chOff x="7670800" y="2268986"/>
+            <a:chExt cx="1448986" cy="1741013"/>
+          </a:xfrm>
+        </p:grpSpPr>
+        <p:pic>
+          <p:nvPicPr>
+            <p:cNvPr id="13" name="Picture 12">
+              <a:extLst>
+                <a:ext uri="{FF2B5EF4-FFF2-40B4-BE49-F238E27FC236}">
+                  <a16:creationId xmlns:a16="http://schemas.microsoft.com/office/drawing/2014/main" id="{BF0E8CE2-A68D-CD01-5686-4B6A53765190}"/>
+                </a:ext>
+              </a:extLst>
+            </p:cNvPr>
+            <p:cNvPicPr>
+              <a:picLocks noChangeAspect="1"/>
+            </p:cNvPicPr>
+            <p:nvPr/>
+          </p:nvPicPr>
+          <p:blipFill>
+            <a:blip r:embed="rId5"/>
+            <a:stretch>
+              <a:fillRect/>
+            </a:stretch>
+          </p:blipFill>
+          <p:spPr>
+            <a:xfrm>
+              <a:off x="7717980" y="2268986"/>
+              <a:ext cx="1354627" cy="1143001"/>
+            </a:xfrm>
+            <a:prstGeom prst="rect">
+              <a:avLst/>
+            </a:prstGeom>
+          </p:spPr>
+        </p:pic>
+        <p:sp>
+          <p:nvSpPr>
+            <p:cNvPr id="19" name="TextBox 18">
+              <a:extLst>
+                <a:ext uri="{FF2B5EF4-FFF2-40B4-BE49-F238E27FC236}">
+                  <a16:creationId xmlns:a16="http://schemas.microsoft.com/office/drawing/2014/main" id="{758FC5B2-BA8D-B8FE-EAD0-DA66FC981161}"/>
+                </a:ext>
+              </a:extLst>
+            </p:cNvPr>
+            <p:cNvSpPr txBox="1"/>
+            <p:nvPr/>
+          </p:nvSpPr>
+          <p:spPr>
+            <a:xfrm>
+              <a:off x="7670800" y="3640667"/>
+              <a:ext cx="1448986" cy="369332"/>
+            </a:xfrm>
+            <a:prstGeom prst="rect">
+              <a:avLst/>
+            </a:prstGeom>
+            <a:noFill/>
+          </p:spPr>
+          <p:txBody>
+            <a:bodyPr wrap="none" rtlCol="0">
+              <a:spAutoFit/>
+            </a:bodyPr>
+            <a:lstStyle/>
+            <a:p>
+              <a:r>
+                <a:rPr lang="en-US" dirty="0"/>
+                <a:t>Programming</a:t>
+              </a:r>
+            </a:p>
+          </p:txBody>
+        </p:sp>
+      </p:grpSp>
+      <p:grpSp>
+        <p:nvGrpSpPr>
+          <p:cNvPr id="25" name="Group 24">
+            <a:extLst>
+              <a:ext uri="{FF2B5EF4-FFF2-40B4-BE49-F238E27FC236}">
+                <a16:creationId xmlns:a16="http://schemas.microsoft.com/office/drawing/2014/main" id="{6F2C4A14-F48D-A9F5-F620-4CDE86537556}"/>
+              </a:ext>
+            </a:extLst>
+          </p:cNvPr>
+          <p:cNvGrpSpPr/>
+          <p:nvPr/>
+        </p:nvGrpSpPr>
+        <p:grpSpPr>
+          <a:xfrm>
+            <a:off x="10084517" y="2679698"/>
+            <a:ext cx="1279315" cy="1741013"/>
+            <a:chOff x="10200627" y="2268986"/>
+            <a:chExt cx="1279315" cy="1741013"/>
+          </a:xfrm>
+        </p:grpSpPr>
+        <p:pic>
+          <p:nvPicPr>
+            <p:cNvPr id="15" name="Picture 14">
+              <a:extLst>
+                <a:ext uri="{FF2B5EF4-FFF2-40B4-BE49-F238E27FC236}">
+                  <a16:creationId xmlns:a16="http://schemas.microsoft.com/office/drawing/2014/main" id="{836FC923-A756-60D6-E6D5-6E9161D6A7AF}"/>
+                </a:ext>
+              </a:extLst>
+            </p:cNvPr>
+            <p:cNvPicPr>
+              <a:picLocks noChangeAspect="1"/>
+            </p:cNvPicPr>
+            <p:nvPr/>
+          </p:nvPicPr>
+          <p:blipFill>
+            <a:blip r:embed="rId6"/>
+            <a:stretch>
+              <a:fillRect/>
+            </a:stretch>
+          </p:blipFill>
+          <p:spPr>
+            <a:xfrm>
+              <a:off x="10301392" y="2268986"/>
+              <a:ext cx="1077784" cy="1143000"/>
+            </a:xfrm>
+            <a:prstGeom prst="rect">
+              <a:avLst/>
+            </a:prstGeom>
+          </p:spPr>
+        </p:pic>
+        <p:sp>
+          <p:nvSpPr>
+            <p:cNvPr id="20" name="TextBox 19">
+              <a:extLst>
+                <a:ext uri="{FF2B5EF4-FFF2-40B4-BE49-F238E27FC236}">
+                  <a16:creationId xmlns:a16="http://schemas.microsoft.com/office/drawing/2014/main" id="{E80848DC-1934-7142-88C4-3AE3D4D889F2}"/>
+                </a:ext>
+              </a:extLst>
+            </p:cNvPr>
+            <p:cNvSpPr txBox="1"/>
+            <p:nvPr/>
+          </p:nvSpPr>
+          <p:spPr>
+            <a:xfrm flipH="1">
+              <a:off x="10200627" y="3640667"/>
+              <a:ext cx="1279315" cy="369332"/>
+            </a:xfrm>
+            <a:prstGeom prst="rect">
+              <a:avLst/>
+            </a:prstGeom>
+            <a:noFill/>
+          </p:spPr>
+          <p:txBody>
+            <a:bodyPr wrap="square" rtlCol="0">
+              <a:spAutoFit/>
+            </a:bodyPr>
+            <a:lstStyle/>
+            <a:p>
+              <a:r>
+                <a:rPr lang="en-US" dirty="0"/>
+                <a:t>Databases</a:t>
+              </a:r>
+            </a:p>
+          </p:txBody>
+        </p:sp>
+      </p:grpSp>
+    </p:spTree>
+    <p:extLst>
+      <p:ext uri="{BB962C8B-B14F-4D97-AF65-F5344CB8AC3E}">
+        <p14:creationId xmlns:p14="http://schemas.microsoft.com/office/powerpoint/2010/main" val="4191324166"/>
+      </p:ext>
+    </p:extLst>
+  </p:cSld>
+  <p:clrMapOvr>
+    <a:masterClrMapping/>
+  </p:clrMapOvr>
+</p:sld>
+</file>
+
 <file path=ppt/theme/theme1.xml><?xml version="1.0" encoding="utf-8"?>
 <a:theme xmlns:a="http://schemas.openxmlformats.org/drawingml/2006/main" name="Office Theme">
   <a:themeElements>

</xml_diff>

<commit_message>
added typical data analysis slide
</commit_message>
<xml_diff>
--- a/WhatIsDataAnalysis.pptx
+++ b/WhatIsDataAnalysis.pptx
@@ -14,6 +14,7 @@
     <p:sldId id="262" r:id="rId8"/>
     <p:sldId id="263" r:id="rId9"/>
     <p:sldId id="264" r:id="rId10"/>
+    <p:sldId id="265" r:id="rId11"/>
   </p:sldIdLst>
   <p:sldSz cx="12192000" cy="6858000"/>
   <p:notesSz cx="6858000" cy="9144000"/>
@@ -3415,6 +3416,359 @@
     <p:extLst>
       <p:ext uri="{BB962C8B-B14F-4D97-AF65-F5344CB8AC3E}">
         <p14:creationId xmlns:p14="http://schemas.microsoft.com/office/powerpoint/2010/main" val="3430274812"/>
+      </p:ext>
+    </p:extLst>
+  </p:cSld>
+  <p:clrMapOvr>
+    <a:masterClrMapping/>
+  </p:clrMapOvr>
+</p:sld>
+</file>
+
+<file path=ppt/slides/slide10.xml><?xml version="1.0" encoding="utf-8"?>
+<p:sld xmlns:a="http://schemas.openxmlformats.org/drawingml/2006/main" xmlns:r="http://schemas.openxmlformats.org/officeDocument/2006/relationships" xmlns:p="http://schemas.openxmlformats.org/presentationml/2006/main">
+  <p:cSld>
+    <p:spTree>
+      <p:nvGrpSpPr>
+        <p:cNvPr id="1" name=""/>
+        <p:cNvGrpSpPr/>
+        <p:nvPr/>
+      </p:nvGrpSpPr>
+      <p:grpSpPr>
+        <a:xfrm>
+          <a:off x="0" y="0"/>
+          <a:ext cx="0" cy="0"/>
+          <a:chOff x="0" y="0"/>
+          <a:chExt cx="0" cy="0"/>
+        </a:xfrm>
+      </p:grpSpPr>
+      <p:sp>
+        <p:nvSpPr>
+          <p:cNvPr id="2" name="Title 1">
+            <a:extLst>
+              <a:ext uri="{FF2B5EF4-FFF2-40B4-BE49-F238E27FC236}">
+                <a16:creationId xmlns:a16="http://schemas.microsoft.com/office/drawing/2014/main" id="{B5B05BE7-0F59-F5D3-A62B-52A3FD6505DA}"/>
+              </a:ext>
+            </a:extLst>
+          </p:cNvPr>
+          <p:cNvSpPr>
+            <a:spLocks noGrp="1"/>
+          </p:cNvSpPr>
+          <p:nvPr>
+            <p:ph type="title"/>
+          </p:nvPr>
+        </p:nvSpPr>
+        <p:spPr/>
+        <p:txBody>
+          <a:bodyPr/>
+          <a:lstStyle/>
+          <a:p>
+            <a:r>
+              <a:rPr lang="en-US" dirty="0"/>
+              <a:t>Typical data analysis</a:t>
+            </a:r>
+          </a:p>
+        </p:txBody>
+      </p:sp>
+      <mc:AlternateContent xmlns:mc="http://schemas.openxmlformats.org/markup-compatibility/2006">
+        <mc:Choice xmlns:a14="http://schemas.microsoft.com/office/drawing/2010/main" Requires="a14">
+          <p:sp>
+            <p:nvSpPr>
+              <p:cNvPr id="3" name="Content Placeholder 2">
+                <a:extLst>
+                  <a:ext uri="{FF2B5EF4-FFF2-40B4-BE49-F238E27FC236}">
+                    <a16:creationId xmlns:a16="http://schemas.microsoft.com/office/drawing/2014/main" id="{B0BF8551-0CA2-0714-902C-7AAD751DB0EB}"/>
+                  </a:ext>
+                </a:extLst>
+              </p:cNvPr>
+              <p:cNvSpPr>
+                <a:spLocks noGrp="1"/>
+              </p:cNvSpPr>
+              <p:nvPr>
+                <p:ph idx="1"/>
+              </p:nvPr>
+            </p:nvSpPr>
+            <p:spPr>
+              <a:xfrm>
+                <a:off x="838199" y="1825625"/>
+                <a:ext cx="10646833" cy="4351338"/>
+              </a:xfrm>
+            </p:spPr>
+            <p:txBody>
+              <a:bodyPr>
+                <a:normAutofit lnSpcReduction="10000"/>
+              </a:bodyPr>
+              <a:lstStyle/>
+              <a:p>
+                <a:pPr marL="514350" marR="0" lvl="0" indent="-514350" algn="l" defTabSz="914400" rtl="0" eaLnBrk="0" fontAlgn="base" latinLnBrk="0" hangingPunct="0">
+                  <a:lnSpc>
+                    <a:spcPct val="100000"/>
+                  </a:lnSpc>
+                  <a:spcBef>
+                    <a:spcPct val="0"/>
+                  </a:spcBef>
+                  <a:spcAft>
+                    <a:spcPct val="0"/>
+                  </a:spcAft>
+                  <a:buClrTx/>
+                  <a:buSzTx/>
+                  <a:buFont typeface="+mj-lt"/>
+                  <a:buAutoNum type="arabicPeriod"/>
+                  <a:tabLst/>
+                </a:pPr>
+                <a:r>
+                  <a:rPr lang="en-US" altLang="en-US" b="1" dirty="0"/>
+                  <a:t>Extract/collect the data:</a:t>
+                </a:r>
+                <a:r>
+                  <a:rPr lang="en-US" altLang="en-US" dirty="0"/>
+                  <a:t> From database, web logs, customer feedback, etc. &amp; transform to a standardized format (e.g. int, float, date ,</a:t>
+                </a:r>
+                <a:r>
+                  <a:rPr lang="en-US" altLang="en-US" dirty="0" err="1"/>
+                  <a:t>etc</a:t>
+                </a:r>
+                <a:r>
+                  <a:rPr lang="en-US" altLang="en-US" dirty="0"/>
+                  <a:t>…)</a:t>
+                </a:r>
+              </a:p>
+              <a:p>
+                <a:pPr marL="514350" marR="0" lvl="0" indent="-514350" algn="l" defTabSz="914400" rtl="0" eaLnBrk="0" fontAlgn="base" latinLnBrk="0" hangingPunct="0">
+                  <a:lnSpc>
+                    <a:spcPct val="100000"/>
+                  </a:lnSpc>
+                  <a:spcBef>
+                    <a:spcPct val="0"/>
+                  </a:spcBef>
+                  <a:spcAft>
+                    <a:spcPct val="0"/>
+                  </a:spcAft>
+                  <a:buClrTx/>
+                  <a:buSzTx/>
+                  <a:buFont typeface="+mj-lt"/>
+                  <a:buAutoNum type="arabicPeriod"/>
+                  <a:tabLst/>
+                </a:pPr>
+                <a:r>
+                  <a:rPr lang="en-US" altLang="en-US" b="1" dirty="0"/>
+                  <a:t>Clean the data:</a:t>
+                </a:r>
+                <a:r>
+                  <a:rPr lang="en-US" altLang="en-US" dirty="0"/>
+                  <a:t> Remove erroneous values from the data; find and replace missing values</a:t>
+                </a:r>
+              </a:p>
+              <a:p>
+                <a:pPr marL="514350" marR="0" lvl="0" indent="-514350" algn="l" defTabSz="914400" rtl="0" eaLnBrk="0" fontAlgn="base" latinLnBrk="0" hangingPunct="0">
+                  <a:lnSpc>
+                    <a:spcPct val="100000"/>
+                  </a:lnSpc>
+                  <a:spcBef>
+                    <a:spcPct val="0"/>
+                  </a:spcBef>
+                  <a:spcAft>
+                    <a:spcPct val="0"/>
+                  </a:spcAft>
+                  <a:buClrTx/>
+                  <a:buSzTx/>
+                  <a:buFont typeface="+mj-lt"/>
+                  <a:buAutoNum type="arabicPeriod"/>
+                  <a:tabLst/>
+                </a:pPr>
+                <a:r>
+                  <a:rPr lang="en-US" altLang="en-US" b="1" dirty="0"/>
+                  <a:t>Normalize data:</a:t>
+                </a:r>
+                <a:r>
+                  <a:rPr lang="en-US" altLang="en-US" dirty="0"/>
+                  <a:t> Scale the values in a practical range (e.g. </a:t>
+                </a:r>
+                <a14:m>
+                  <m:oMath xmlns:m="http://schemas.openxmlformats.org/officeDocument/2006/math">
+                    <m:d>
+                      <m:dPr>
+                        <m:begChr m:val="["/>
+                        <m:endChr m:val="]"/>
+                        <m:ctrlPr>
+                          <a:rPr lang="en-US" altLang="en-US" i="1" smtClean="0">
+                            <a:latin typeface="Cambria Math" panose="02040503050406030204" pitchFamily="18" charset="0"/>
+                          </a:rPr>
+                        </m:ctrlPr>
+                      </m:dPr>
+                      <m:e>
+                        <m:r>
+                          <a:rPr lang="fr-FR" altLang="en-US" b="0" i="1" smtClean="0">
+                            <a:latin typeface="Cambria Math" panose="02040503050406030204" pitchFamily="18" charset="0"/>
+                          </a:rPr>
+                          <m:t>0,1</m:t>
+                        </m:r>
+                      </m:e>
+                    </m:d>
+                  </m:oMath>
+                </a14:m>
+                <a:r>
+                  <a:rPr lang="en-US" altLang="en-US" dirty="0"/>
+                  <a:t> or </a:t>
+                </a:r>
+                <a14:m>
+                  <m:oMath xmlns:m="http://schemas.openxmlformats.org/officeDocument/2006/math">
+                    <m:r>
+                      <a:rPr lang="fr-FR" altLang="en-US" b="0" i="1" smtClean="0">
+                        <a:latin typeface="Cambria Math" panose="02040503050406030204" pitchFamily="18" charset="0"/>
+                      </a:rPr>
+                      <m:t>𝜇</m:t>
+                    </m:r>
+                    <m:r>
+                      <a:rPr lang="fr-FR" altLang="en-US" b="0" i="1" smtClean="0">
+                        <a:latin typeface="Cambria Math" panose="02040503050406030204" pitchFamily="18" charset="0"/>
+                      </a:rPr>
+                      <m:t>=0, </m:t>
+                    </m:r>
+                    <m:r>
+                      <a:rPr lang="fr-FR" altLang="en-US" b="0" i="1" smtClean="0">
+                        <a:latin typeface="Cambria Math" panose="02040503050406030204" pitchFamily="18" charset="0"/>
+                      </a:rPr>
+                      <m:t>𝜎</m:t>
+                    </m:r>
+                    <m:r>
+                      <a:rPr lang="fr-FR" altLang="en-US" b="0" i="1" smtClean="0">
+                        <a:latin typeface="Cambria Math" panose="02040503050406030204" pitchFamily="18" charset="0"/>
+                      </a:rPr>
+                      <m:t>=1</m:t>
+                    </m:r>
+                  </m:oMath>
+                </a14:m>
+                <a:r>
+                  <a:rPr lang="en-US" altLang="en-US" dirty="0"/>
+                  <a:t> )</a:t>
+                </a:r>
+              </a:p>
+              <a:p>
+                <a:pPr marL="514350" marR="0" lvl="0" indent="-514350" algn="l" defTabSz="914400" rtl="0" eaLnBrk="0" fontAlgn="base" latinLnBrk="0" hangingPunct="0">
+                  <a:lnSpc>
+                    <a:spcPct val="100000"/>
+                  </a:lnSpc>
+                  <a:spcBef>
+                    <a:spcPct val="0"/>
+                  </a:spcBef>
+                  <a:spcAft>
+                    <a:spcPct val="0"/>
+                  </a:spcAft>
+                  <a:buClrTx/>
+                  <a:buSzTx/>
+                  <a:buFont typeface="+mj-lt"/>
+                  <a:buAutoNum type="arabicPeriod"/>
+                  <a:tabLst/>
+                </a:pPr>
+                <a:r>
+                  <a:rPr lang="en-US" altLang="en-US" b="1" dirty="0"/>
+                  <a:t>Analyze data:</a:t>
+                </a:r>
+                <a:r>
+                  <a:rPr lang="en-US" altLang="en-US" dirty="0"/>
+                  <a:t> find patterns and make future predictions</a:t>
+                </a:r>
+              </a:p>
+              <a:p>
+                <a:pPr marL="514350" marR="0" lvl="0" indent="-514350" algn="l" defTabSz="914400" rtl="0" eaLnBrk="0" fontAlgn="base" latinLnBrk="0" hangingPunct="0">
+                  <a:lnSpc>
+                    <a:spcPct val="100000"/>
+                  </a:lnSpc>
+                  <a:spcBef>
+                    <a:spcPct val="0"/>
+                  </a:spcBef>
+                  <a:spcAft>
+                    <a:spcPct val="0"/>
+                  </a:spcAft>
+                  <a:buClrTx/>
+                  <a:buSzTx/>
+                  <a:buFont typeface="+mj-lt"/>
+                  <a:buAutoNum type="arabicPeriod"/>
+                  <a:tabLst/>
+                </a:pPr>
+                <a:r>
+                  <a:rPr lang="en-US" altLang="en-US" b="1" dirty="0"/>
+                  <a:t>Represent the result:</a:t>
+                </a:r>
+                <a:r>
+                  <a:rPr lang="en-US" altLang="en-US" dirty="0"/>
+                  <a:t> Present the result with useful insights in a way the company/user can understand</a:t>
+                </a:r>
+              </a:p>
+              <a:p>
+                <a:pPr marL="0" marR="0" lvl="0" indent="0" algn="l" defTabSz="914400" rtl="0" eaLnBrk="0" fontAlgn="base" latinLnBrk="0" hangingPunct="0">
+                  <a:lnSpc>
+                    <a:spcPct val="100000"/>
+                  </a:lnSpc>
+                  <a:spcBef>
+                    <a:spcPct val="0"/>
+                  </a:spcBef>
+                  <a:spcAft>
+                    <a:spcPct val="0"/>
+                  </a:spcAft>
+                  <a:buClrTx/>
+                  <a:buSzTx/>
+                  <a:buFontTx/>
+                  <a:buNone/>
+                  <a:tabLst/>
+                </a:pPr>
+                <a:endParaRPr lang="en-US" altLang="en-US" dirty="0"/>
+              </a:p>
+              <a:p>
+                <a:endParaRPr lang="en-US" dirty="0"/>
+              </a:p>
+            </p:txBody>
+          </p:sp>
+        </mc:Choice>
+        <mc:Fallback>
+          <p:sp>
+            <p:nvSpPr>
+              <p:cNvPr id="3" name="Content Placeholder 2">
+                <a:extLst>
+                  <a:ext uri="{FF2B5EF4-FFF2-40B4-BE49-F238E27FC236}">
+                    <a16:creationId xmlns:a16="http://schemas.microsoft.com/office/drawing/2014/main" id="{B0BF8551-0CA2-0714-902C-7AAD751DB0EB}"/>
+                  </a:ext>
+                </a:extLst>
+              </p:cNvPr>
+              <p:cNvSpPr>
+                <a:spLocks noGrp="1" noRot="1" noChangeAspect="1" noMove="1" noResize="1" noEditPoints="1" noAdjustHandles="1" noChangeArrowheads="1" noChangeShapeType="1" noTextEdit="1"/>
+              </p:cNvSpPr>
+              <p:nvPr>
+                <p:ph idx="1"/>
+              </p:nvPr>
+            </p:nvSpPr>
+            <p:spPr>
+              <a:xfrm>
+                <a:off x="838199" y="1825625"/>
+                <a:ext cx="10646833" cy="4351338"/>
+              </a:xfrm>
+              <a:blipFill>
+                <a:blip r:embed="rId2"/>
+                <a:stretch>
+                  <a:fillRect l="-1145" t="-2381" r="-1030"/>
+                </a:stretch>
+              </a:blipFill>
+            </p:spPr>
+            <p:txBody>
+              <a:bodyPr/>
+              <a:lstStyle/>
+              <a:p>
+                <a:r>
+                  <a:rPr lang="en-US">
+                    <a:noFill/>
+                  </a:rPr>
+                  <a:t> </a:t>
+                </a:r>
+              </a:p>
+            </p:txBody>
+          </p:sp>
+        </mc:Fallback>
+      </mc:AlternateContent>
+    </p:spTree>
+    <p:extLst>
+      <p:ext uri="{BB962C8B-B14F-4D97-AF65-F5344CB8AC3E}">
+        <p14:creationId xmlns:p14="http://schemas.microsoft.com/office/powerpoint/2010/main" val="1857859845"/>
       </p:ext>
     </p:extLst>
   </p:cSld>

</xml_diff>

<commit_message>
added DA pros and cons slide
</commit_message>
<xml_diff>
--- a/WhatIsDataAnalysis.pptx
+++ b/WhatIsDataAnalysis.pptx
@@ -15,6 +15,7 @@
     <p:sldId id="263" r:id="rId9"/>
     <p:sldId id="264" r:id="rId10"/>
     <p:sldId id="265" r:id="rId11"/>
+    <p:sldId id="266" r:id="rId12"/>
   </p:sldIdLst>
   <p:sldSz cx="12192000" cy="6858000"/>
   <p:notesSz cx="6858000" cy="9144000"/>
@@ -4113,6 +4114,225 @@
       <p:bldP spid="3" grpId="0" build="p"/>
     </p:bldLst>
   </p:timing>
+</p:sld>
+</file>
+
+<file path=ppt/slides/slide11.xml><?xml version="1.0" encoding="utf-8"?>
+<p:sld xmlns:a="http://schemas.openxmlformats.org/drawingml/2006/main" xmlns:r="http://schemas.openxmlformats.org/officeDocument/2006/relationships" xmlns:p="http://schemas.openxmlformats.org/presentationml/2006/main">
+  <p:cSld>
+    <p:spTree>
+      <p:nvGrpSpPr>
+        <p:cNvPr id="1" name=""/>
+        <p:cNvGrpSpPr/>
+        <p:nvPr/>
+      </p:nvGrpSpPr>
+      <p:grpSpPr>
+        <a:xfrm>
+          <a:off x="0" y="0"/>
+          <a:ext cx="0" cy="0"/>
+          <a:chOff x="0" y="0"/>
+          <a:chExt cx="0" cy="0"/>
+        </a:xfrm>
+      </p:grpSpPr>
+      <p:sp>
+        <p:nvSpPr>
+          <p:cNvPr id="4" name="Title 3">
+            <a:extLst>
+              <a:ext uri="{FF2B5EF4-FFF2-40B4-BE49-F238E27FC236}">
+                <a16:creationId xmlns:a16="http://schemas.microsoft.com/office/drawing/2014/main" id="{5691F913-FDBA-E797-BF76-4A80D76FE9CF}"/>
+              </a:ext>
+            </a:extLst>
+          </p:cNvPr>
+          <p:cNvSpPr>
+            <a:spLocks noGrp="1"/>
+          </p:cNvSpPr>
+          <p:nvPr>
+            <p:ph type="title"/>
+          </p:nvPr>
+        </p:nvSpPr>
+        <p:spPr/>
+        <p:txBody>
+          <a:bodyPr/>
+          <a:lstStyle/>
+          <a:p>
+            <a:r>
+              <a:rPr lang="en-US" dirty="0"/>
+              <a:t>Data Analysis</a:t>
+            </a:r>
+          </a:p>
+        </p:txBody>
+      </p:sp>
+      <p:sp>
+        <p:nvSpPr>
+          <p:cNvPr id="5" name="Text Placeholder 4">
+            <a:extLst>
+              <a:ext uri="{FF2B5EF4-FFF2-40B4-BE49-F238E27FC236}">
+                <a16:creationId xmlns:a16="http://schemas.microsoft.com/office/drawing/2014/main" id="{C79F3766-F8D1-28A6-EBFF-97E3F37A4A67}"/>
+              </a:ext>
+            </a:extLst>
+          </p:cNvPr>
+          <p:cNvSpPr>
+            <a:spLocks noGrp="1"/>
+          </p:cNvSpPr>
+          <p:nvPr>
+            <p:ph type="body" idx="1"/>
+          </p:nvPr>
+        </p:nvSpPr>
+        <p:spPr/>
+        <p:txBody>
+          <a:bodyPr/>
+          <a:lstStyle/>
+          <a:p>
+            <a:r>
+              <a:rPr lang="en-US" dirty="0"/>
+              <a:t>Pros</a:t>
+            </a:r>
+          </a:p>
+        </p:txBody>
+      </p:sp>
+      <p:sp>
+        <p:nvSpPr>
+          <p:cNvPr id="6" name="Content Placeholder 5">
+            <a:extLst>
+              <a:ext uri="{FF2B5EF4-FFF2-40B4-BE49-F238E27FC236}">
+                <a16:creationId xmlns:a16="http://schemas.microsoft.com/office/drawing/2014/main" id="{5DA6A2BF-D79F-0408-477F-D3EBC77E9ED3}"/>
+              </a:ext>
+            </a:extLst>
+          </p:cNvPr>
+          <p:cNvSpPr>
+            <a:spLocks noGrp="1"/>
+          </p:cNvSpPr>
+          <p:nvPr>
+            <p:ph sz="half" idx="2"/>
+          </p:nvPr>
+        </p:nvSpPr>
+        <p:spPr/>
+        <p:txBody>
+          <a:bodyPr/>
+          <a:lstStyle/>
+          <a:p>
+            <a:r>
+              <a:rPr lang="en-GB" dirty="0"/>
+              <a:t>Improved decision-making</a:t>
+            </a:r>
+          </a:p>
+          <a:p>
+            <a:r>
+              <a:rPr lang="en-GB" dirty="0"/>
+              <a:t>Cost-effective</a:t>
+            </a:r>
+          </a:p>
+          <a:p>
+            <a:r>
+              <a:rPr lang="en-GB" dirty="0"/>
+              <a:t>Innovation</a:t>
+            </a:r>
+          </a:p>
+          <a:p>
+            <a:r>
+              <a:rPr lang="en-GB" dirty="0"/>
+              <a:t>Competitive advantage</a:t>
+            </a:r>
+          </a:p>
+          <a:p>
+            <a:r>
+              <a:rPr lang="en-GB" dirty="0"/>
+              <a:t>Personalization</a:t>
+            </a:r>
+          </a:p>
+        </p:txBody>
+      </p:sp>
+      <p:sp>
+        <p:nvSpPr>
+          <p:cNvPr id="7" name="Text Placeholder 6">
+            <a:extLst>
+              <a:ext uri="{FF2B5EF4-FFF2-40B4-BE49-F238E27FC236}">
+                <a16:creationId xmlns:a16="http://schemas.microsoft.com/office/drawing/2014/main" id="{42C78C46-F27F-BD1C-1746-7E847DFD0A03}"/>
+              </a:ext>
+            </a:extLst>
+          </p:cNvPr>
+          <p:cNvSpPr>
+            <a:spLocks noGrp="1"/>
+          </p:cNvSpPr>
+          <p:nvPr>
+            <p:ph type="body" sz="quarter" idx="3"/>
+          </p:nvPr>
+        </p:nvSpPr>
+        <p:spPr/>
+        <p:txBody>
+          <a:bodyPr/>
+          <a:lstStyle/>
+          <a:p>
+            <a:r>
+              <a:rPr lang="en-US" dirty="0"/>
+              <a:t>Cons</a:t>
+            </a:r>
+          </a:p>
+        </p:txBody>
+      </p:sp>
+      <p:sp>
+        <p:nvSpPr>
+          <p:cNvPr id="8" name="Content Placeholder 7">
+            <a:extLst>
+              <a:ext uri="{FF2B5EF4-FFF2-40B4-BE49-F238E27FC236}">
+                <a16:creationId xmlns:a16="http://schemas.microsoft.com/office/drawing/2014/main" id="{609E7249-C6ED-8A5A-164B-666E4BA1EBB0}"/>
+              </a:ext>
+            </a:extLst>
+          </p:cNvPr>
+          <p:cNvSpPr>
+            <a:spLocks noGrp="1"/>
+          </p:cNvSpPr>
+          <p:nvPr>
+            <p:ph sz="quarter" idx="4"/>
+          </p:nvPr>
+        </p:nvSpPr>
+        <p:spPr/>
+        <p:txBody>
+          <a:bodyPr/>
+          <a:lstStyle/>
+          <a:p>
+            <a:r>
+              <a:rPr lang="en-GB" dirty="0"/>
+              <a:t>Data quality</a:t>
+            </a:r>
+          </a:p>
+          <a:p>
+            <a:r>
+              <a:rPr lang="en-GB" dirty="0"/>
+              <a:t>Privacy concerns</a:t>
+            </a:r>
+          </a:p>
+          <a:p>
+            <a:r>
+              <a:rPr lang="en-GB" dirty="0"/>
+              <a:t>Complexity</a:t>
+            </a:r>
+          </a:p>
+          <a:p>
+            <a:r>
+              <a:rPr lang="en-GB" dirty="0"/>
+              <a:t>Bias</a:t>
+            </a:r>
+          </a:p>
+          <a:p>
+            <a:r>
+              <a:rPr lang="en-GB" dirty="0"/>
+              <a:t>Interpretation</a:t>
+            </a:r>
+            <a:endParaRPr lang="en-US" dirty="0"/>
+          </a:p>
+        </p:txBody>
+      </p:sp>
+    </p:spTree>
+    <p:extLst>
+      <p:ext uri="{BB962C8B-B14F-4D97-AF65-F5344CB8AC3E}">
+        <p14:creationId xmlns:p14="http://schemas.microsoft.com/office/powerpoint/2010/main" val="337870467"/>
+      </p:ext>
+    </p:extLst>
+  </p:cSld>
+  <p:clrMapOvr>
+    <a:masterClrMapping/>
+  </p:clrMapOvr>
 </p:sld>
 </file>
 

</xml_diff>